<commit_message>
Első 2 dia elkészítve
</commit_message>
<xml_diff>
--- a/A Windows történelme.pptx
+++ b/A Windows történelme.pptx
@@ -7,6 +7,8 @@
   <p:sldIdLst>
     <p:sldId id="256" r:id="rId2"/>
     <p:sldId id="257" r:id="rId3"/>
+    <p:sldId id="258" r:id="rId4"/>
+    <p:sldId id="259" r:id="rId5"/>
   </p:sldIdLst>
   <p:sldSz cx="12192000" cy="6858000"/>
   <p:notesSz cx="6858000" cy="9144000"/>
@@ -5402,8 +5404,12 @@
           <a:lstStyle/>
           <a:p>
             <a:r>
+              <a:rPr lang="hu-HU" dirty="0"/>
+              <a:t>a </a:t>
+            </a:r>
+            <a:r>
               <a:rPr lang="hu-HU" dirty="0" smtClean="0"/>
-              <a:t>Windows 1.0: a kezdetek</a:t>
+              <a:t>kezdetek: Windows 1.0</a:t>
             </a:r>
             <a:endParaRPr lang="hu-HU" dirty="0"/>
           </a:p>
@@ -5446,7 +5452,7 @@
       </p:sp>
       <p:pic>
         <p:nvPicPr>
-          <p:cNvPr id="4" name="Kép 3"/>
+          <p:cNvPr id="5" name="Kép 4"/>
           <p:cNvPicPr>
             <a:picLocks noChangeAspect="1"/>
           </p:cNvPicPr>
@@ -5466,18 +5472,268 @@
         </p:blipFill>
         <p:spPr>
           <a:xfrm>
-            <a:off x="6252032" y="1673510"/>
-            <a:ext cx="5780862" cy="3167432"/>
+            <a:off x="6234056" y="1220545"/>
+            <a:ext cx="5791200" cy="3642360"/>
           </a:xfrm>
           <a:prstGeom prst="rect">
             <a:avLst/>
           </a:prstGeom>
         </p:spPr>
       </p:pic>
+      <p:sp>
+        <p:nvSpPr>
+          <p:cNvPr id="6" name="Szövegdoboz 5"/>
+          <p:cNvSpPr txBox="1"/>
+          <p:nvPr/>
+        </p:nvSpPr>
+        <p:spPr>
+          <a:xfrm>
+            <a:off x="6785591" y="4835812"/>
+            <a:ext cx="5185185" cy="246221"/>
+          </a:xfrm>
+          <a:prstGeom prst="rect">
+            <a:avLst/>
+          </a:prstGeom>
+          <a:noFill/>
+        </p:spPr>
+        <p:txBody>
+          <a:bodyPr wrap="square" rtlCol="0">
+            <a:spAutoFit/>
+          </a:bodyPr>
+          <a:lstStyle/>
+          <a:p>
+            <a:r>
+              <a:rPr lang="hu-HU" sz="1000" dirty="0"/>
+              <a:t>Forrás: https://cdn.wccftech.com/wp-content/uploads/2019/07/windows-1.0.jpg</a:t>
+            </a:r>
+          </a:p>
+        </p:txBody>
+      </p:sp>
     </p:spTree>
     <p:extLst>
       <p:ext uri="{BB962C8B-B14F-4D97-AF65-F5344CB8AC3E}">
         <p14:creationId xmlns:p14="http://schemas.microsoft.com/office/powerpoint/2010/main" val="1770334282"/>
+      </p:ext>
+    </p:extLst>
+  </p:cSld>
+  <p:clrMapOvr>
+    <a:masterClrMapping/>
+  </p:clrMapOvr>
+</p:sld>
+</file>
+
+<file path=ppt/slides/slide3.xml><?xml version="1.0" encoding="utf-8"?>
+<p:sld xmlns:a="http://schemas.openxmlformats.org/drawingml/2006/main" xmlns:r="http://schemas.openxmlformats.org/officeDocument/2006/relationships" xmlns:p="http://schemas.openxmlformats.org/presentationml/2006/main">
+  <p:cSld>
+    <p:spTree>
+      <p:nvGrpSpPr>
+        <p:cNvPr id="1" name=""/>
+        <p:cNvGrpSpPr/>
+        <p:nvPr/>
+      </p:nvGrpSpPr>
+      <p:grpSpPr>
+        <a:xfrm>
+          <a:off x="0" y="0"/>
+          <a:ext cx="0" cy="0"/>
+          <a:chOff x="0" y="0"/>
+          <a:chExt cx="0" cy="0"/>
+        </a:xfrm>
+      </p:grpSpPr>
+      <p:sp>
+        <p:nvSpPr>
+          <p:cNvPr id="2" name="Cím 1"/>
+          <p:cNvSpPr>
+            <a:spLocks noGrp="1"/>
+          </p:cNvSpPr>
+          <p:nvPr>
+            <p:ph type="title"/>
+          </p:nvPr>
+        </p:nvSpPr>
+        <p:spPr/>
+        <p:txBody>
+          <a:bodyPr/>
+          <a:lstStyle/>
+          <a:p>
+            <a:r>
+              <a:rPr lang="hu-HU" dirty="0" smtClean="0"/>
+              <a:t>Windows 95-98</a:t>
+            </a:r>
+            <a:endParaRPr lang="hu-HU" dirty="0"/>
+          </a:p>
+        </p:txBody>
+      </p:sp>
+      <p:sp>
+        <p:nvSpPr>
+          <p:cNvPr id="3" name="Tartalom helye 2"/>
+          <p:cNvSpPr>
+            <a:spLocks noGrp="1"/>
+          </p:cNvSpPr>
+          <p:nvPr>
+            <p:ph idx="1"/>
+          </p:nvPr>
+        </p:nvSpPr>
+        <p:spPr/>
+        <p:txBody>
+          <a:bodyPr/>
+          <a:lstStyle/>
+          <a:p>
+            <a:r>
+              <a:rPr lang="hu-HU" dirty="0" smtClean="0"/>
+              <a:t>1995 és 1998</a:t>
+            </a:r>
+          </a:p>
+          <a:p>
+            <a:r>
+              <a:rPr lang="hu-HU" dirty="0" smtClean="0"/>
+              <a:t>Windows 98=Ráncfelvarrás</a:t>
+            </a:r>
+          </a:p>
+          <a:p>
+            <a:r>
+              <a:rPr lang="hu-HU" dirty="0" smtClean="0"/>
+              <a:t>Első nagy siker</a:t>
+            </a:r>
+          </a:p>
+          <a:p>
+            <a:r>
+              <a:rPr lang="hu-HU" dirty="0" smtClean="0"/>
+              <a:t>Internet Explorer és Office</a:t>
+            </a:r>
+            <a:endParaRPr lang="hu-HU" dirty="0"/>
+          </a:p>
+        </p:txBody>
+      </p:sp>
+      <p:pic>
+        <p:nvPicPr>
+          <p:cNvPr id="6" name="Kép 5"/>
+          <p:cNvPicPr>
+            <a:picLocks noChangeAspect="1"/>
+          </p:cNvPicPr>
+          <p:nvPr/>
+        </p:nvPicPr>
+        <p:blipFill>
+          <a:blip r:embed="rId2">
+            <a:extLst>
+              <a:ext uri="{28A0092B-C50C-407E-A947-70E740481C1C}">
+                <a14:useLocalDpi xmlns:a14="http://schemas.microsoft.com/office/drawing/2010/main" val="0"/>
+              </a:ext>
+            </a:extLst>
+          </a:blip>
+          <a:stretch>
+            <a:fillRect/>
+          </a:stretch>
+        </p:blipFill>
+        <p:spPr>
+          <a:xfrm>
+            <a:off x="4951412" y="1098192"/>
+            <a:ext cx="6892066" cy="3865550"/>
+          </a:xfrm>
+          <a:prstGeom prst="rect">
+            <a:avLst/>
+          </a:prstGeom>
+        </p:spPr>
+      </p:pic>
+      <p:sp>
+        <p:nvSpPr>
+          <p:cNvPr id="7" name="Szövegdoboz 6"/>
+          <p:cNvSpPr txBox="1"/>
+          <p:nvPr/>
+        </p:nvSpPr>
+        <p:spPr>
+          <a:xfrm>
+            <a:off x="5681138" y="4976024"/>
+            <a:ext cx="5432613" cy="400110"/>
+          </a:xfrm>
+          <a:prstGeom prst="rect">
+            <a:avLst/>
+          </a:prstGeom>
+          <a:noFill/>
+        </p:spPr>
+        <p:txBody>
+          <a:bodyPr wrap="square" rtlCol="0">
+            <a:spAutoFit/>
+          </a:bodyPr>
+          <a:lstStyle/>
+          <a:p>
+            <a:r>
+              <a:rPr lang="hu-HU" sz="1000" dirty="0"/>
+              <a:t>https://i.cdn29.hu/apix_collect_c/2005/microsoft-misc/microsoft_misc_screenshot_20200824112747_1_original_1150x645_cover.jpg</a:t>
+            </a:r>
+          </a:p>
+        </p:txBody>
+      </p:sp>
+    </p:spTree>
+    <p:extLst>
+      <p:ext uri="{BB962C8B-B14F-4D97-AF65-F5344CB8AC3E}">
+        <p14:creationId xmlns:p14="http://schemas.microsoft.com/office/powerpoint/2010/main" val="2406541700"/>
+      </p:ext>
+    </p:extLst>
+  </p:cSld>
+  <p:clrMapOvr>
+    <a:masterClrMapping/>
+  </p:clrMapOvr>
+</p:sld>
+</file>
+
+<file path=ppt/slides/slide4.xml><?xml version="1.0" encoding="utf-8"?>
+<p:sld xmlns:a="http://schemas.openxmlformats.org/drawingml/2006/main" xmlns:r="http://schemas.openxmlformats.org/officeDocument/2006/relationships" xmlns:p="http://schemas.openxmlformats.org/presentationml/2006/main">
+  <p:cSld>
+    <p:spTree>
+      <p:nvGrpSpPr>
+        <p:cNvPr id="1" name=""/>
+        <p:cNvGrpSpPr/>
+        <p:nvPr/>
+      </p:nvGrpSpPr>
+      <p:grpSpPr>
+        <a:xfrm>
+          <a:off x="0" y="0"/>
+          <a:ext cx="0" cy="0"/>
+          <a:chOff x="0" y="0"/>
+          <a:chExt cx="0" cy="0"/>
+        </a:xfrm>
+      </p:grpSpPr>
+      <p:sp>
+        <p:nvSpPr>
+          <p:cNvPr id="2" name="Cím 1"/>
+          <p:cNvSpPr>
+            <a:spLocks noGrp="1"/>
+          </p:cNvSpPr>
+          <p:nvPr>
+            <p:ph type="title"/>
+          </p:nvPr>
+        </p:nvSpPr>
+        <p:spPr/>
+        <p:txBody>
+          <a:bodyPr/>
+          <a:lstStyle/>
+          <a:p>
+            <a:endParaRPr lang="hu-HU"/>
+          </a:p>
+        </p:txBody>
+      </p:sp>
+      <p:sp>
+        <p:nvSpPr>
+          <p:cNvPr id="3" name="Tartalom helye 2"/>
+          <p:cNvSpPr>
+            <a:spLocks noGrp="1"/>
+          </p:cNvSpPr>
+          <p:nvPr>
+            <p:ph idx="1"/>
+          </p:nvPr>
+        </p:nvSpPr>
+        <p:spPr/>
+        <p:txBody>
+          <a:bodyPr/>
+          <a:lstStyle/>
+          <a:p>
+            <a:endParaRPr lang="hu-HU"/>
+          </a:p>
+        </p:txBody>
+      </p:sp>
+    </p:spTree>
+    <p:extLst>
+      <p:ext uri="{BB962C8B-B14F-4D97-AF65-F5344CB8AC3E}">
+        <p14:creationId xmlns:p14="http://schemas.microsoft.com/office/powerpoint/2010/main" val="3118527809"/>
       </p:ext>
     </p:extLst>
   </p:cSld>

</xml_diff>

<commit_message>
Win11-ig diák készen, csak pár modosítás kell még
</commit_message>
<xml_diff>
--- a/A Windows történelme.pptx
+++ b/A Windows történelme.pptx
@@ -9,6 +9,12 @@
     <p:sldId id="257" r:id="rId3"/>
     <p:sldId id="258" r:id="rId4"/>
     <p:sldId id="259" r:id="rId5"/>
+    <p:sldId id="260" r:id="rId6"/>
+    <p:sldId id="261" r:id="rId7"/>
+    <p:sldId id="262" r:id="rId8"/>
+    <p:sldId id="263" r:id="rId9"/>
+    <p:sldId id="264" r:id="rId10"/>
+    <p:sldId id="265" r:id="rId11"/>
   </p:sldIdLst>
   <p:sldSz cx="12192000" cy="6858000"/>
   <p:notesSz cx="6858000" cy="9144000"/>
@@ -107,6 +113,11 @@
       </a:defRPr>
     </a:lvl9pPr>
   </p:defaultTextStyle>
+  <p:extLst>
+    <p:ext uri="{EFAFB233-063F-42B5-8137-9DF3F51BA10A}">
+      <p15:sldGuideLst xmlns:p15="http://schemas.microsoft.com/office/powerpoint/2012/main"/>
+    </p:ext>
+  </p:extLst>
 </p:presentation>
 </file>
 
@@ -302,7 +313,7 @@
             <a:fld id="{B61BEF0D-F0BB-DE4B-95CE-6DB70DBA9567}" type="datetimeFigureOut">
               <a:rPr lang="en-US" dirty="0"/>
               <a:pPr/>
-              <a:t>9/14/2022</a:t>
+              <a:t>9/15/2022</a:t>
             </a:fld>
             <a:endParaRPr lang="en-US" dirty="0"/>
           </a:p>
@@ -735,7 +746,7 @@
             <a:fld id="{B61BEF0D-F0BB-DE4B-95CE-6DB70DBA9567}" type="datetimeFigureOut">
               <a:rPr lang="en-US" dirty="0"/>
               <a:pPr/>
-              <a:t>9/14/2022</a:t>
+              <a:t>9/15/2022</a:t>
             </a:fld>
             <a:endParaRPr lang="en-US" dirty="0"/>
           </a:p>
@@ -982,7 +993,7 @@
             <a:fld id="{B61BEF0D-F0BB-DE4B-95CE-6DB70DBA9567}" type="datetimeFigureOut">
               <a:rPr lang="en-US" dirty="0"/>
               <a:pPr/>
-              <a:t>9/14/2022</a:t>
+              <a:t>9/15/2022</a:t>
             </a:fld>
             <a:endParaRPr lang="en-US" dirty="0"/>
           </a:p>
@@ -1287,7 +1298,7 @@
             <a:fld id="{B61BEF0D-F0BB-DE4B-95CE-6DB70DBA9567}" type="datetimeFigureOut">
               <a:rPr lang="en-US" dirty="0"/>
               <a:pPr/>
-              <a:t>9/14/2022</a:t>
+              <a:t>9/15/2022</a:t>
             </a:fld>
             <a:endParaRPr lang="en-US" dirty="0"/>
           </a:p>
@@ -1602,7 +1613,7 @@
             <a:fld id="{B61BEF0D-F0BB-DE4B-95CE-6DB70DBA9567}" type="datetimeFigureOut">
               <a:rPr lang="en-US" dirty="0"/>
               <a:pPr/>
-              <a:t>9/14/2022</a:t>
+              <a:t>9/15/2022</a:t>
             </a:fld>
             <a:endParaRPr lang="en-US" dirty="0"/>
           </a:p>
@@ -1901,7 +1912,7 @@
             <a:fld id="{B61BEF0D-F0BB-DE4B-95CE-6DB70DBA9567}" type="datetimeFigureOut">
               <a:rPr lang="en-US" dirty="0"/>
               <a:pPr/>
-              <a:t>9/14/2022</a:t>
+              <a:t>9/15/2022</a:t>
             </a:fld>
             <a:endParaRPr lang="en-US" dirty="0"/>
           </a:p>
@@ -2265,7 +2276,7 @@
             <a:fld id="{B61BEF0D-F0BB-DE4B-95CE-6DB70DBA9567}" type="datetimeFigureOut">
               <a:rPr lang="en-US" dirty="0"/>
               <a:pPr/>
-              <a:t>9/14/2022</a:t>
+              <a:t>9/15/2022</a:t>
             </a:fld>
             <a:endParaRPr lang="en-US" dirty="0"/>
           </a:p>
@@ -2436,7 +2447,7 @@
             <a:fld id="{B61BEF0D-F0BB-DE4B-95CE-6DB70DBA9567}" type="datetimeFigureOut">
               <a:rPr lang="en-US" dirty="0"/>
               <a:pPr/>
-              <a:t>9/14/2022</a:t>
+              <a:t>9/15/2022</a:t>
             </a:fld>
             <a:endParaRPr lang="en-US" dirty="0"/>
           </a:p>
@@ -2613,7 +2624,7 @@
             <a:fld id="{B61BEF0D-F0BB-DE4B-95CE-6DB70DBA9567}" type="datetimeFigureOut">
               <a:rPr lang="en-US" dirty="0"/>
               <a:pPr/>
-              <a:t>9/14/2022</a:t>
+              <a:t>9/15/2022</a:t>
             </a:fld>
             <a:endParaRPr lang="en-US" dirty="0"/>
           </a:p>
@@ -2780,7 +2791,7 @@
             <a:fld id="{B61BEF0D-F0BB-DE4B-95CE-6DB70DBA9567}" type="datetimeFigureOut">
               <a:rPr lang="en-US" dirty="0"/>
               <a:pPr/>
-              <a:t>9/14/2022</a:t>
+              <a:t>9/15/2022</a:t>
             </a:fld>
             <a:endParaRPr lang="en-US" dirty="0"/>
           </a:p>
@@ -3027,7 +3038,7 @@
             <a:fld id="{B61BEF0D-F0BB-DE4B-95CE-6DB70DBA9567}" type="datetimeFigureOut">
               <a:rPr lang="en-US" dirty="0"/>
               <a:pPr/>
-              <a:t>9/14/2022</a:t>
+              <a:t>9/15/2022</a:t>
             </a:fld>
             <a:endParaRPr lang="en-US" dirty="0"/>
           </a:p>
@@ -3260,7 +3271,7 @@
             <a:fld id="{B61BEF0D-F0BB-DE4B-95CE-6DB70DBA9567}" type="datetimeFigureOut">
               <a:rPr lang="en-US" dirty="0"/>
               <a:pPr/>
-              <a:t>9/14/2022</a:t>
+              <a:t>9/15/2022</a:t>
             </a:fld>
             <a:endParaRPr lang="en-US" dirty="0"/>
           </a:p>
@@ -3639,7 +3650,7 @@
             <a:fld id="{B61BEF0D-F0BB-DE4B-95CE-6DB70DBA9567}" type="datetimeFigureOut">
               <a:rPr lang="en-US" dirty="0"/>
               <a:pPr/>
-              <a:t>9/14/2022</a:t>
+              <a:t>9/15/2022</a:t>
             </a:fld>
             <a:endParaRPr lang="en-US" dirty="0"/>
           </a:p>
@@ -3754,7 +3765,7 @@
             <a:fld id="{B61BEF0D-F0BB-DE4B-95CE-6DB70DBA9567}" type="datetimeFigureOut">
               <a:rPr lang="en-US" dirty="0"/>
               <a:pPr/>
-              <a:t>9/14/2022</a:t>
+              <a:t>9/15/2022</a:t>
             </a:fld>
             <a:endParaRPr lang="en-US" dirty="0"/>
           </a:p>
@@ -3846,7 +3857,7 @@
             <a:fld id="{B61BEF0D-F0BB-DE4B-95CE-6DB70DBA9567}" type="datetimeFigureOut">
               <a:rPr lang="en-US" dirty="0"/>
               <a:pPr/>
-              <a:t>9/14/2022</a:t>
+              <a:t>9/15/2022</a:t>
             </a:fld>
             <a:endParaRPr lang="en-US" dirty="0"/>
           </a:p>
@@ -4098,7 +4109,7 @@
             <a:fld id="{B61BEF0D-F0BB-DE4B-95CE-6DB70DBA9567}" type="datetimeFigureOut">
               <a:rPr lang="en-US" dirty="0"/>
               <a:pPr/>
-              <a:t>9/14/2022</a:t>
+              <a:t>9/15/2022</a:t>
             </a:fld>
             <a:endParaRPr lang="en-US" dirty="0"/>
           </a:p>
@@ -4378,7 +4389,7 @@
             <a:fld id="{B61BEF0D-F0BB-DE4B-95CE-6DB70DBA9567}" type="datetimeFigureOut">
               <a:rPr lang="en-US" dirty="0"/>
               <a:pPr/>
-              <a:t>9/14/2022</a:t>
+              <a:t>9/15/2022</a:t>
             </a:fld>
             <a:endParaRPr lang="en-US" dirty="0"/>
           </a:p>
@@ -4781,7 +4792,7 @@
             <a:fld id="{B61BEF0D-F0BB-DE4B-95CE-6DB70DBA9567}" type="datetimeFigureOut">
               <a:rPr lang="en-US" dirty="0"/>
               <a:pPr/>
-              <a:t>9/14/2022</a:t>
+              <a:t>9/15/2022</a:t>
             </a:fld>
             <a:endParaRPr lang="en-US" dirty="0"/>
           </a:p>
@@ -5371,6 +5382,93 @@
 </p:sld>
 </file>
 
+<file path=ppt/slides/slide10.xml><?xml version="1.0" encoding="utf-8"?>
+<p:sld xmlns:a="http://schemas.openxmlformats.org/drawingml/2006/main" xmlns:r="http://schemas.openxmlformats.org/officeDocument/2006/relationships" xmlns:p="http://schemas.openxmlformats.org/presentationml/2006/main">
+  <p:cSld>
+    <p:spTree>
+      <p:nvGrpSpPr>
+        <p:cNvPr id="1" name=""/>
+        <p:cNvGrpSpPr/>
+        <p:nvPr/>
+      </p:nvGrpSpPr>
+      <p:grpSpPr>
+        <a:xfrm>
+          <a:off x="0" y="0"/>
+          <a:ext cx="0" cy="0"/>
+          <a:chOff x="0" y="0"/>
+          <a:chExt cx="0" cy="0"/>
+        </a:xfrm>
+      </p:grpSpPr>
+      <p:sp>
+        <p:nvSpPr>
+          <p:cNvPr id="2" name="Cím 1"/>
+          <p:cNvSpPr>
+            <a:spLocks noGrp="1"/>
+          </p:cNvSpPr>
+          <p:nvPr>
+            <p:ph type="title"/>
+          </p:nvPr>
+        </p:nvSpPr>
+        <p:spPr/>
+        <p:txBody>
+          <a:bodyPr/>
+          <a:lstStyle/>
+          <a:p>
+            <a:r>
+              <a:rPr lang="hu-HU" dirty="0" smtClean="0"/>
+              <a:t>Windows 11</a:t>
+            </a:r>
+            <a:endParaRPr lang="hu-HU" dirty="0"/>
+          </a:p>
+        </p:txBody>
+      </p:sp>
+      <p:sp>
+        <p:nvSpPr>
+          <p:cNvPr id="3" name="Tartalom helye 2"/>
+          <p:cNvSpPr>
+            <a:spLocks noGrp="1"/>
+          </p:cNvSpPr>
+          <p:nvPr>
+            <p:ph idx="1"/>
+          </p:nvPr>
+        </p:nvSpPr>
+        <p:spPr/>
+        <p:txBody>
+          <a:bodyPr/>
+          <a:lstStyle/>
+          <a:p>
+            <a:r>
+              <a:rPr lang="hu-HU" dirty="0" smtClean="0"/>
+              <a:t>2021 október</a:t>
+            </a:r>
+          </a:p>
+          <a:p>
+            <a:r>
+              <a:rPr lang="hu-HU" dirty="0" smtClean="0"/>
+              <a:t>Szigorú rendszerkövetelmények</a:t>
+            </a:r>
+          </a:p>
+          <a:p>
+            <a:r>
+              <a:rPr lang="hu-HU" dirty="0" smtClean="0"/>
+              <a:t>Modernizált felület</a:t>
+            </a:r>
+          </a:p>
+        </p:txBody>
+      </p:sp>
+    </p:spTree>
+    <p:extLst>
+      <p:ext uri="{BB962C8B-B14F-4D97-AF65-F5344CB8AC3E}">
+        <p14:creationId xmlns:p14="http://schemas.microsoft.com/office/powerpoint/2010/main" val="1670091177"/>
+      </p:ext>
+    </p:extLst>
+  </p:cSld>
+  <p:clrMapOvr>
+    <a:masterClrMapping/>
+  </p:clrMapOvr>
+</p:sld>
+</file>
+
 <file path=ppt/slides/slide2.xml><?xml version="1.0" encoding="utf-8"?>
 <p:sld xmlns:a="http://schemas.openxmlformats.org/drawingml/2006/main" xmlns:r="http://schemas.openxmlformats.org/officeDocument/2006/relationships" xmlns:p="http://schemas.openxmlformats.org/presentationml/2006/main">
   <p:cSld>
@@ -5504,8 +5602,13 @@
           <a:p>
             <a:r>
               <a:rPr lang="hu-HU" sz="1000" dirty="0"/>
-              <a:t>Forrás: https://cdn.wccftech.com/wp-content/uploads/2019/07/windows-1.0.jpg</a:t>
-            </a:r>
+              <a:t>Forrás</a:t>
+            </a:r>
+            <a:r>
+              <a:rPr lang="hu-HU" sz="1000" dirty="0"/>
+              <a:t>: https://bit.ly/3eLHgEt</a:t>
+            </a:r>
+            <a:endParaRPr lang="hu-HU" sz="1000" dirty="0"/>
           </a:p>
         </p:txBody>
       </p:sp>
@@ -5591,8 +5694,19 @@
           <a:p>
             <a:r>
               <a:rPr lang="hu-HU" dirty="0" smtClean="0"/>
-              <a:t>Első nagy siker</a:t>
-            </a:r>
+              <a:t>Első nagy </a:t>
+            </a:r>
+            <a:r>
+              <a:rPr lang="hu-HU" dirty="0" smtClean="0"/>
+              <a:t>siker</a:t>
+            </a:r>
+          </a:p>
+          <a:p>
+            <a:r>
+              <a:rPr lang="hu-HU" dirty="0" smtClean="0"/>
+              <a:t>Start menü</a:t>
+            </a:r>
+            <a:endParaRPr lang="hu-HU" dirty="0" smtClean="0"/>
           </a:p>
           <a:p>
             <a:r>
@@ -5625,8 +5739,8 @@
         </p:blipFill>
         <p:spPr>
           <a:xfrm>
-            <a:off x="4951412" y="1098192"/>
-            <a:ext cx="6892066" cy="3865550"/>
+            <a:off x="5386808" y="112902"/>
+            <a:ext cx="5145418" cy="2885908"/>
           </a:xfrm>
           <a:prstGeom prst="rect">
             <a:avLst/>
@@ -5641,8 +5755,8 @@
         </p:nvSpPr>
         <p:spPr>
           <a:xfrm>
-            <a:off x="5681138" y="4976024"/>
-            <a:ext cx="5432613" cy="400110"/>
+            <a:off x="5308896" y="2947749"/>
+            <a:ext cx="5432613" cy="246221"/>
           </a:xfrm>
           <a:prstGeom prst="rect">
             <a:avLst/>
@@ -5657,7 +5771,71 @@
           <a:p>
             <a:r>
               <a:rPr lang="hu-HU" sz="1000" dirty="0"/>
-              <a:t>https://i.cdn29.hu/apix_collect_c/2005/microsoft-misc/microsoft_misc_screenshot_20200824112747_1_original_1150x645_cover.jpg</a:t>
+              <a:t>Forrás: https://bit.ly/3U7mlfv</a:t>
+            </a:r>
+            <a:endParaRPr lang="hu-HU" sz="1000" dirty="0"/>
+          </a:p>
+        </p:txBody>
+      </p:sp>
+      <p:pic>
+        <p:nvPicPr>
+          <p:cNvPr id="4" name="Kép 3"/>
+          <p:cNvPicPr>
+            <a:picLocks noChangeAspect="1"/>
+          </p:cNvPicPr>
+          <p:nvPr/>
+        </p:nvPicPr>
+        <p:blipFill>
+          <a:blip r:embed="rId3">
+            <a:extLst>
+              <a:ext uri="{28A0092B-C50C-407E-A947-70E740481C1C}">
+                <a14:useLocalDpi xmlns:a14="http://schemas.microsoft.com/office/drawing/2010/main" val="0"/>
+              </a:ext>
+            </a:extLst>
+          </a:blip>
+          <a:stretch>
+            <a:fillRect/>
+          </a:stretch>
+        </p:blipFill>
+        <p:spPr>
+          <a:xfrm>
+            <a:off x="7108319" y="3085505"/>
+            <a:ext cx="4769226" cy="3576920"/>
+          </a:xfrm>
+          <a:prstGeom prst="rect">
+            <a:avLst/>
+          </a:prstGeom>
+        </p:spPr>
+      </p:pic>
+      <p:sp>
+        <p:nvSpPr>
+          <p:cNvPr id="5" name="Szövegdoboz 4"/>
+          <p:cNvSpPr txBox="1"/>
+          <p:nvPr/>
+        </p:nvSpPr>
+        <p:spPr>
+          <a:xfrm>
+            <a:off x="7108319" y="6626009"/>
+            <a:ext cx="1915909" cy="246221"/>
+          </a:xfrm>
+          <a:prstGeom prst="rect">
+            <a:avLst/>
+          </a:prstGeom>
+          <a:noFill/>
+        </p:spPr>
+        <p:txBody>
+          <a:bodyPr wrap="none" rtlCol="0">
+            <a:spAutoFit/>
+          </a:bodyPr>
+          <a:lstStyle/>
+          <a:p>
+            <a:r>
+              <a:rPr lang="hu-HU" sz="1000" dirty="0" err="1"/>
+              <a:t>Forrás:https</a:t>
+            </a:r>
+            <a:r>
+              <a:rPr lang="hu-HU" sz="1000" dirty="0"/>
+              <a:t>://bit.ly/3RKEheg</a:t>
             </a:r>
           </a:p>
         </p:txBody>
@@ -5707,7 +5885,11 @@
           <a:bodyPr/>
           <a:lstStyle/>
           <a:p>
-            <a:endParaRPr lang="hu-HU"/>
+            <a:r>
+              <a:rPr lang="hu-HU" dirty="0" smtClean="0"/>
+              <a:t>Windows ME</a:t>
+            </a:r>
+            <a:endParaRPr lang="hu-HU" dirty="0"/>
           </a:p>
         </p:txBody>
       </p:sp>
@@ -5721,12 +5903,108 @@
             <p:ph idx="1"/>
           </p:nvPr>
         </p:nvSpPr>
-        <p:spPr/>
-        <p:txBody>
-          <a:bodyPr/>
-          <a:lstStyle/>
-          <a:p>
-            <a:endParaRPr lang="hu-HU"/>
+        <p:spPr>
+          <a:xfrm>
+            <a:off x="0" y="778933"/>
+            <a:ext cx="8534400" cy="3615267"/>
+          </a:xfrm>
+        </p:spPr>
+        <p:txBody>
+          <a:bodyPr/>
+          <a:lstStyle/>
+          <a:p>
+            <a:r>
+              <a:rPr lang="hu-HU" dirty="0" smtClean="0"/>
+              <a:t>2000 Június</a:t>
+            </a:r>
+          </a:p>
+          <a:p>
+            <a:r>
+              <a:rPr lang="hu-HU" dirty="0" smtClean="0"/>
+              <a:t>Kevés újdonság</a:t>
+            </a:r>
+          </a:p>
+          <a:p>
+            <a:r>
+              <a:rPr lang="hu-HU" dirty="0" smtClean="0"/>
+              <a:t>Instabilitás</a:t>
+            </a:r>
+          </a:p>
+          <a:p>
+            <a:r>
+              <a:rPr lang="hu-HU" dirty="0" smtClean="0"/>
+              <a:t>Egyik </a:t>
+            </a:r>
+            <a:r>
+              <a:rPr lang="hu-HU" dirty="0" err="1" smtClean="0"/>
+              <a:t>legutáltabb</a:t>
+            </a:r>
+            <a:r>
+              <a:rPr lang="hu-HU" dirty="0" smtClean="0"/>
+              <a:t> Windows</a:t>
+            </a:r>
+          </a:p>
+          <a:p>
+            <a:endParaRPr lang="hu-HU" dirty="0"/>
+          </a:p>
+        </p:txBody>
+      </p:sp>
+      <p:pic>
+        <p:nvPicPr>
+          <p:cNvPr id="4" name="Kép 3"/>
+          <p:cNvPicPr>
+            <a:picLocks noChangeAspect="1"/>
+          </p:cNvPicPr>
+          <p:nvPr/>
+        </p:nvPicPr>
+        <p:blipFill>
+          <a:blip r:embed="rId2">
+            <a:extLst>
+              <a:ext uri="{28A0092B-C50C-407E-A947-70E740481C1C}">
+                <a14:useLocalDpi xmlns:a14="http://schemas.microsoft.com/office/drawing/2010/main" val="0"/>
+              </a:ext>
+            </a:extLst>
+          </a:blip>
+          <a:stretch>
+            <a:fillRect/>
+          </a:stretch>
+        </p:blipFill>
+        <p:spPr>
+          <a:xfrm>
+            <a:off x="3879272" y="685800"/>
+            <a:ext cx="7592292" cy="4217940"/>
+          </a:xfrm>
+          <a:prstGeom prst="rect">
+            <a:avLst/>
+          </a:prstGeom>
+        </p:spPr>
+      </p:pic>
+      <p:sp>
+        <p:nvSpPr>
+          <p:cNvPr id="5" name="Szövegdoboz 4"/>
+          <p:cNvSpPr txBox="1"/>
+          <p:nvPr/>
+        </p:nvSpPr>
+        <p:spPr>
+          <a:xfrm>
+            <a:off x="6184669" y="4871533"/>
+            <a:ext cx="3470822" cy="369332"/>
+          </a:xfrm>
+          <a:prstGeom prst="rect">
+            <a:avLst/>
+          </a:prstGeom>
+          <a:noFill/>
+        </p:spPr>
+        <p:txBody>
+          <a:bodyPr wrap="none" rtlCol="0">
+            <a:spAutoFit/>
+          </a:bodyPr>
+          <a:lstStyle/>
+          <a:p>
+            <a:r>
+              <a:rPr lang="hu-HU" dirty="0"/>
+              <a:t>Forrás: https://bit.ly/3qGoC3v</a:t>
+            </a:r>
           </a:p>
         </p:txBody>
       </p:sp>
@@ -5734,6 +6012,599 @@
     <p:extLst>
       <p:ext uri="{BB962C8B-B14F-4D97-AF65-F5344CB8AC3E}">
         <p14:creationId xmlns:p14="http://schemas.microsoft.com/office/powerpoint/2010/main" val="3118527809"/>
+      </p:ext>
+    </p:extLst>
+  </p:cSld>
+  <p:clrMapOvr>
+    <a:masterClrMapping/>
+  </p:clrMapOvr>
+</p:sld>
+</file>
+
+<file path=ppt/slides/slide5.xml><?xml version="1.0" encoding="utf-8"?>
+<p:sld xmlns:a="http://schemas.openxmlformats.org/drawingml/2006/main" xmlns:r="http://schemas.openxmlformats.org/officeDocument/2006/relationships" xmlns:p="http://schemas.openxmlformats.org/presentationml/2006/main">
+  <p:cSld>
+    <p:spTree>
+      <p:nvGrpSpPr>
+        <p:cNvPr id="1" name=""/>
+        <p:cNvGrpSpPr/>
+        <p:nvPr/>
+      </p:nvGrpSpPr>
+      <p:grpSpPr>
+        <a:xfrm>
+          <a:off x="0" y="0"/>
+          <a:ext cx="0" cy="0"/>
+          <a:chOff x="0" y="0"/>
+          <a:chExt cx="0" cy="0"/>
+        </a:xfrm>
+      </p:grpSpPr>
+      <p:sp>
+        <p:nvSpPr>
+          <p:cNvPr id="2" name="Cím 1"/>
+          <p:cNvSpPr>
+            <a:spLocks noGrp="1"/>
+          </p:cNvSpPr>
+          <p:nvPr>
+            <p:ph type="title"/>
+          </p:nvPr>
+        </p:nvSpPr>
+        <p:spPr/>
+        <p:txBody>
+          <a:bodyPr/>
+          <a:lstStyle/>
+          <a:p>
+            <a:r>
+              <a:rPr lang="hu-HU" dirty="0" smtClean="0"/>
+              <a:t>Windows </a:t>
+            </a:r>
+            <a:r>
+              <a:rPr lang="hu-HU" dirty="0" err="1" smtClean="0"/>
+              <a:t>xp</a:t>
+            </a:r>
+            <a:endParaRPr lang="hu-HU" dirty="0"/>
+          </a:p>
+        </p:txBody>
+      </p:sp>
+      <p:sp>
+        <p:nvSpPr>
+          <p:cNvPr id="3" name="Tartalom helye 2"/>
+          <p:cNvSpPr>
+            <a:spLocks noGrp="1"/>
+          </p:cNvSpPr>
+          <p:nvPr>
+            <p:ph idx="1"/>
+          </p:nvPr>
+        </p:nvSpPr>
+        <p:spPr/>
+        <p:txBody>
+          <a:bodyPr/>
+          <a:lstStyle/>
+          <a:p>
+            <a:r>
+              <a:rPr lang="hu-HU" dirty="0" smtClean="0"/>
+              <a:t>2001 Október</a:t>
+            </a:r>
+          </a:p>
+          <a:p>
+            <a:r>
+              <a:rPr lang="hu-HU" dirty="0" smtClean="0"/>
+              <a:t>400+ millió példány </a:t>
+            </a:r>
+            <a:r>
+              <a:rPr lang="hu-HU" dirty="0"/>
+              <a:t>(forrás: </a:t>
+            </a:r>
+            <a:r>
+              <a:rPr lang="hu-HU" dirty="0">
+                <a:hlinkClick r:id="rId2"/>
+              </a:rPr>
+              <a:t>https://</a:t>
+            </a:r>
+            <a:r>
+              <a:rPr lang="hu-HU" dirty="0" smtClean="0">
+                <a:hlinkClick r:id="rId2"/>
+              </a:rPr>
+              <a:t>bit.ly/3qGHqji</a:t>
+            </a:r>
+            <a:r>
+              <a:rPr lang="hu-HU" dirty="0" smtClean="0"/>
+              <a:t>)</a:t>
+            </a:r>
+          </a:p>
+          <a:p>
+            <a:r>
+              <a:rPr lang="hu-HU" dirty="0" smtClean="0"/>
+              <a:t>NT Kernel</a:t>
+            </a:r>
+          </a:p>
+          <a:p>
+            <a:r>
+              <a:rPr lang="hu-HU" dirty="0" err="1" smtClean="0"/>
+              <a:t>Mái</a:t>
+            </a:r>
+            <a:r>
+              <a:rPr lang="hu-HU" dirty="0" smtClean="0"/>
+              <a:t> napig használják</a:t>
+            </a:r>
+          </a:p>
+          <a:p>
+            <a:r>
+              <a:rPr lang="hu-HU" dirty="0" smtClean="0"/>
+              <a:t>Első 64 bites Windows</a:t>
+            </a:r>
+          </a:p>
+          <a:p>
+            <a:r>
+              <a:rPr lang="hu-HU" dirty="0" smtClean="0"/>
+              <a:t>(kép később)</a:t>
+            </a:r>
+            <a:endParaRPr lang="hu-HU" dirty="0"/>
+          </a:p>
+        </p:txBody>
+      </p:sp>
+    </p:spTree>
+    <p:extLst>
+      <p:ext uri="{BB962C8B-B14F-4D97-AF65-F5344CB8AC3E}">
+        <p14:creationId xmlns:p14="http://schemas.microsoft.com/office/powerpoint/2010/main" val="3080236854"/>
+      </p:ext>
+    </p:extLst>
+  </p:cSld>
+  <p:clrMapOvr>
+    <a:masterClrMapping/>
+  </p:clrMapOvr>
+</p:sld>
+</file>
+
+<file path=ppt/slides/slide6.xml><?xml version="1.0" encoding="utf-8"?>
+<p:sld xmlns:a="http://schemas.openxmlformats.org/drawingml/2006/main" xmlns:r="http://schemas.openxmlformats.org/officeDocument/2006/relationships" xmlns:p="http://schemas.openxmlformats.org/presentationml/2006/main">
+  <p:cSld>
+    <p:spTree>
+      <p:nvGrpSpPr>
+        <p:cNvPr id="1" name=""/>
+        <p:cNvGrpSpPr/>
+        <p:nvPr/>
+      </p:nvGrpSpPr>
+      <p:grpSpPr>
+        <a:xfrm>
+          <a:off x="0" y="0"/>
+          <a:ext cx="0" cy="0"/>
+          <a:chOff x="0" y="0"/>
+          <a:chExt cx="0" cy="0"/>
+        </a:xfrm>
+      </p:grpSpPr>
+      <p:sp>
+        <p:nvSpPr>
+          <p:cNvPr id="2" name="Cím 1"/>
+          <p:cNvSpPr>
+            <a:spLocks noGrp="1"/>
+          </p:cNvSpPr>
+          <p:nvPr>
+            <p:ph type="title"/>
+          </p:nvPr>
+        </p:nvSpPr>
+        <p:spPr/>
+        <p:txBody>
+          <a:bodyPr/>
+          <a:lstStyle/>
+          <a:p>
+            <a:r>
+              <a:rPr lang="hu-HU" dirty="0" smtClean="0"/>
+              <a:t>Windows </a:t>
+            </a:r>
+            <a:r>
+              <a:rPr lang="hu-HU" dirty="0" err="1" smtClean="0"/>
+              <a:t>vista</a:t>
+            </a:r>
+            <a:endParaRPr lang="hu-HU" dirty="0"/>
+          </a:p>
+        </p:txBody>
+      </p:sp>
+      <p:sp>
+        <p:nvSpPr>
+          <p:cNvPr id="3" name="Tartalom helye 2"/>
+          <p:cNvSpPr>
+            <a:spLocks noGrp="1"/>
+          </p:cNvSpPr>
+          <p:nvPr>
+            <p:ph idx="1"/>
+          </p:nvPr>
+        </p:nvSpPr>
+        <p:spPr/>
+        <p:txBody>
+          <a:bodyPr/>
+          <a:lstStyle/>
+          <a:p>
+            <a:r>
+              <a:rPr lang="hu-HU" dirty="0" smtClean="0"/>
+              <a:t>2007 </a:t>
+            </a:r>
+          </a:p>
+          <a:p>
+            <a:r>
+              <a:rPr lang="hu-HU" dirty="0" smtClean="0"/>
+              <a:t>OS X-szerű </a:t>
+            </a:r>
+            <a:r>
+              <a:rPr lang="hu-HU" dirty="0" err="1" smtClean="0"/>
+              <a:t>Aero</a:t>
+            </a:r>
+            <a:r>
+              <a:rPr lang="hu-HU" dirty="0" smtClean="0"/>
+              <a:t> téma</a:t>
+            </a:r>
+          </a:p>
+          <a:p>
+            <a:r>
+              <a:rPr lang="hu-HU" dirty="0" smtClean="0"/>
+              <a:t>Magasabb gépigény = kisebb felhasználói bázis</a:t>
+            </a:r>
+          </a:p>
+          <a:p>
+            <a:r>
+              <a:rPr lang="hu-HU" dirty="0" smtClean="0"/>
+              <a:t>Driver problémák</a:t>
+            </a:r>
+          </a:p>
+        </p:txBody>
+      </p:sp>
+      <p:pic>
+        <p:nvPicPr>
+          <p:cNvPr id="4" name="Kép 3"/>
+          <p:cNvPicPr>
+            <a:picLocks noChangeAspect="1"/>
+          </p:cNvPicPr>
+          <p:nvPr/>
+        </p:nvPicPr>
+        <p:blipFill>
+          <a:blip r:embed="rId2">
+            <a:extLst>
+              <a:ext uri="{28A0092B-C50C-407E-A947-70E740481C1C}">
+                <a14:useLocalDpi xmlns:a14="http://schemas.microsoft.com/office/drawing/2010/main" val="0"/>
+              </a:ext>
+            </a:extLst>
+          </a:blip>
+          <a:stretch>
+            <a:fillRect/>
+          </a:stretch>
+        </p:blipFill>
+        <p:spPr>
+          <a:xfrm>
+            <a:off x="6295504" y="3292655"/>
+            <a:ext cx="4826926" cy="2642742"/>
+          </a:xfrm>
+          <a:prstGeom prst="rect">
+            <a:avLst/>
+          </a:prstGeom>
+        </p:spPr>
+      </p:pic>
+      <p:sp>
+        <p:nvSpPr>
+          <p:cNvPr id="5" name="Szövegdoboz 4"/>
+          <p:cNvSpPr txBox="1"/>
+          <p:nvPr/>
+        </p:nvSpPr>
+        <p:spPr>
+          <a:xfrm>
+            <a:off x="7107137" y="5935397"/>
+            <a:ext cx="2111475" cy="369332"/>
+          </a:xfrm>
+          <a:prstGeom prst="rect">
+            <a:avLst/>
+          </a:prstGeom>
+          <a:noFill/>
+        </p:spPr>
+        <p:txBody>
+          <a:bodyPr wrap="none" rtlCol="0">
+            <a:spAutoFit/>
+          </a:bodyPr>
+          <a:lstStyle/>
+          <a:p>
+            <a:r>
+              <a:rPr lang="hu-HU" dirty="0" smtClean="0"/>
+              <a:t>Saját kép később</a:t>
+            </a:r>
+            <a:endParaRPr lang="hu-HU" dirty="0"/>
+          </a:p>
+        </p:txBody>
+      </p:sp>
+    </p:spTree>
+    <p:extLst>
+      <p:ext uri="{BB962C8B-B14F-4D97-AF65-F5344CB8AC3E}">
+        <p14:creationId xmlns:p14="http://schemas.microsoft.com/office/powerpoint/2010/main" val="3366573032"/>
+      </p:ext>
+    </p:extLst>
+  </p:cSld>
+  <p:clrMapOvr>
+    <a:masterClrMapping/>
+  </p:clrMapOvr>
+</p:sld>
+</file>
+
+<file path=ppt/slides/slide7.xml><?xml version="1.0" encoding="utf-8"?>
+<p:sld xmlns:a="http://schemas.openxmlformats.org/drawingml/2006/main" xmlns:r="http://schemas.openxmlformats.org/officeDocument/2006/relationships" xmlns:p="http://schemas.openxmlformats.org/presentationml/2006/main">
+  <p:cSld>
+    <p:spTree>
+      <p:nvGrpSpPr>
+        <p:cNvPr id="1" name=""/>
+        <p:cNvGrpSpPr/>
+        <p:nvPr/>
+      </p:nvGrpSpPr>
+      <p:grpSpPr>
+        <a:xfrm>
+          <a:off x="0" y="0"/>
+          <a:ext cx="0" cy="0"/>
+          <a:chOff x="0" y="0"/>
+          <a:chExt cx="0" cy="0"/>
+        </a:xfrm>
+      </p:grpSpPr>
+      <p:sp>
+        <p:nvSpPr>
+          <p:cNvPr id="2" name="Cím 1"/>
+          <p:cNvSpPr>
+            <a:spLocks noGrp="1"/>
+          </p:cNvSpPr>
+          <p:nvPr>
+            <p:ph type="title"/>
+          </p:nvPr>
+        </p:nvSpPr>
+        <p:spPr/>
+        <p:txBody>
+          <a:bodyPr/>
+          <a:lstStyle/>
+          <a:p>
+            <a:r>
+              <a:rPr lang="hu-HU" dirty="0" smtClean="0"/>
+              <a:t>Windows 7</a:t>
+            </a:r>
+            <a:endParaRPr lang="hu-HU" dirty="0"/>
+          </a:p>
+        </p:txBody>
+      </p:sp>
+      <p:sp>
+        <p:nvSpPr>
+          <p:cNvPr id="3" name="Tartalom helye 2"/>
+          <p:cNvSpPr>
+            <a:spLocks noGrp="1"/>
+          </p:cNvSpPr>
+          <p:nvPr>
+            <p:ph idx="1"/>
+          </p:nvPr>
+        </p:nvSpPr>
+        <p:spPr/>
+        <p:txBody>
+          <a:bodyPr/>
+          <a:lstStyle/>
+          <a:p>
+            <a:r>
+              <a:rPr lang="hu-HU" dirty="0" smtClean="0"/>
+              <a:t>2009</a:t>
+            </a:r>
+          </a:p>
+          <a:p>
+            <a:r>
+              <a:rPr lang="hu-HU" dirty="0" smtClean="0"/>
+              <a:t>Stabilitás növelése</a:t>
+            </a:r>
+          </a:p>
+          <a:p>
+            <a:r>
+              <a:rPr lang="hu-HU" dirty="0" smtClean="0"/>
+              <a:t>Vista célja: Újdonságok</a:t>
+            </a:r>
+          </a:p>
+          <a:p>
+            <a:r>
+              <a:rPr lang="hu-HU" dirty="0" smtClean="0"/>
+              <a:t>7 célja: Stabilitás</a:t>
+            </a:r>
+          </a:p>
+          <a:p>
+            <a:r>
+              <a:rPr lang="hu-HU" dirty="0" smtClean="0"/>
+              <a:t>Mindenben jobb</a:t>
+            </a:r>
+            <a:endParaRPr lang="hu-HU" dirty="0"/>
+          </a:p>
+        </p:txBody>
+      </p:sp>
+    </p:spTree>
+    <p:extLst>
+      <p:ext uri="{BB962C8B-B14F-4D97-AF65-F5344CB8AC3E}">
+        <p14:creationId xmlns:p14="http://schemas.microsoft.com/office/powerpoint/2010/main" val="3985290816"/>
+      </p:ext>
+    </p:extLst>
+  </p:cSld>
+  <p:clrMapOvr>
+    <a:masterClrMapping/>
+  </p:clrMapOvr>
+</p:sld>
+</file>
+
+<file path=ppt/slides/slide8.xml><?xml version="1.0" encoding="utf-8"?>
+<p:sld xmlns:a="http://schemas.openxmlformats.org/drawingml/2006/main" xmlns:r="http://schemas.openxmlformats.org/officeDocument/2006/relationships" xmlns:p="http://schemas.openxmlformats.org/presentationml/2006/main">
+  <p:cSld>
+    <p:spTree>
+      <p:nvGrpSpPr>
+        <p:cNvPr id="1" name=""/>
+        <p:cNvGrpSpPr/>
+        <p:nvPr/>
+      </p:nvGrpSpPr>
+      <p:grpSpPr>
+        <a:xfrm>
+          <a:off x="0" y="0"/>
+          <a:ext cx="0" cy="0"/>
+          <a:chOff x="0" y="0"/>
+          <a:chExt cx="0" cy="0"/>
+        </a:xfrm>
+      </p:grpSpPr>
+      <p:sp>
+        <p:nvSpPr>
+          <p:cNvPr id="2" name="Cím 1"/>
+          <p:cNvSpPr>
+            <a:spLocks noGrp="1"/>
+          </p:cNvSpPr>
+          <p:nvPr>
+            <p:ph type="title"/>
+          </p:nvPr>
+        </p:nvSpPr>
+        <p:spPr/>
+        <p:txBody>
+          <a:bodyPr/>
+          <a:lstStyle/>
+          <a:p>
+            <a:r>
+              <a:rPr lang="hu-HU" dirty="0" smtClean="0"/>
+              <a:t>Windows 8 és 8.1</a:t>
+            </a:r>
+            <a:endParaRPr lang="hu-HU" dirty="0"/>
+          </a:p>
+        </p:txBody>
+      </p:sp>
+      <p:sp>
+        <p:nvSpPr>
+          <p:cNvPr id="3" name="Tartalom helye 2"/>
+          <p:cNvSpPr>
+            <a:spLocks noGrp="1"/>
+          </p:cNvSpPr>
+          <p:nvPr>
+            <p:ph idx="1"/>
+          </p:nvPr>
+        </p:nvSpPr>
+        <p:spPr/>
+        <p:txBody>
+          <a:bodyPr/>
+          <a:lstStyle/>
+          <a:p>
+            <a:r>
+              <a:rPr lang="hu-HU" dirty="0" smtClean="0"/>
+              <a:t>2012</a:t>
+            </a:r>
+          </a:p>
+          <a:p>
+            <a:r>
+              <a:rPr lang="hu-HU" dirty="0" smtClean="0"/>
+              <a:t>Metro felület: népszerűtlen</a:t>
+            </a:r>
+          </a:p>
+          <a:p>
+            <a:r>
+              <a:rPr lang="hu-HU" dirty="0" smtClean="0"/>
+              <a:t>Tablet támogatás</a:t>
+            </a:r>
+          </a:p>
+          <a:p>
+            <a:r>
+              <a:rPr lang="hu-HU" dirty="0" smtClean="0"/>
+              <a:t>Ökoszisztéma </a:t>
+            </a:r>
+            <a:r>
+              <a:rPr lang="hu-HU" dirty="0" err="1" smtClean="0"/>
+              <a:t>alapkövei</a:t>
+            </a:r>
+            <a:endParaRPr lang="hu-HU" dirty="0" smtClean="0"/>
+          </a:p>
+          <a:p>
+            <a:r>
+              <a:rPr lang="hu-HU" dirty="0" smtClean="0"/>
+              <a:t>8.1 célja=hibák javítása</a:t>
+            </a:r>
+            <a:endParaRPr lang="hu-HU" dirty="0"/>
+          </a:p>
+        </p:txBody>
+      </p:sp>
+    </p:spTree>
+    <p:extLst>
+      <p:ext uri="{BB962C8B-B14F-4D97-AF65-F5344CB8AC3E}">
+        <p14:creationId xmlns:p14="http://schemas.microsoft.com/office/powerpoint/2010/main" val="61634132"/>
+      </p:ext>
+    </p:extLst>
+  </p:cSld>
+  <p:clrMapOvr>
+    <a:masterClrMapping/>
+  </p:clrMapOvr>
+</p:sld>
+</file>
+
+<file path=ppt/slides/slide9.xml><?xml version="1.0" encoding="utf-8"?>
+<p:sld xmlns:a="http://schemas.openxmlformats.org/drawingml/2006/main" xmlns:r="http://schemas.openxmlformats.org/officeDocument/2006/relationships" xmlns:p="http://schemas.openxmlformats.org/presentationml/2006/main">
+  <p:cSld>
+    <p:spTree>
+      <p:nvGrpSpPr>
+        <p:cNvPr id="1" name=""/>
+        <p:cNvGrpSpPr/>
+        <p:nvPr/>
+      </p:nvGrpSpPr>
+      <p:grpSpPr>
+        <a:xfrm>
+          <a:off x="0" y="0"/>
+          <a:ext cx="0" cy="0"/>
+          <a:chOff x="0" y="0"/>
+          <a:chExt cx="0" cy="0"/>
+        </a:xfrm>
+      </p:grpSpPr>
+      <p:sp>
+        <p:nvSpPr>
+          <p:cNvPr id="2" name="Cím 1"/>
+          <p:cNvSpPr>
+            <a:spLocks noGrp="1"/>
+          </p:cNvSpPr>
+          <p:nvPr>
+            <p:ph type="title"/>
+          </p:nvPr>
+        </p:nvSpPr>
+        <p:spPr/>
+        <p:txBody>
+          <a:bodyPr/>
+          <a:lstStyle/>
+          <a:p>
+            <a:r>
+              <a:rPr lang="hu-HU" dirty="0" smtClean="0"/>
+              <a:t>Windows 10</a:t>
+            </a:r>
+            <a:endParaRPr lang="hu-HU" dirty="0"/>
+          </a:p>
+        </p:txBody>
+      </p:sp>
+      <p:sp>
+        <p:nvSpPr>
+          <p:cNvPr id="3" name="Tartalom helye 2"/>
+          <p:cNvSpPr>
+            <a:spLocks noGrp="1"/>
+          </p:cNvSpPr>
+          <p:nvPr>
+            <p:ph idx="1"/>
+          </p:nvPr>
+        </p:nvSpPr>
+        <p:spPr/>
+        <p:txBody>
+          <a:bodyPr/>
+          <a:lstStyle/>
+          <a:p>
+            <a:r>
+              <a:rPr lang="hu-HU" dirty="0" smtClean="0"/>
+              <a:t>2015 július 28</a:t>
+            </a:r>
+          </a:p>
+          <a:p>
+            <a:r>
+              <a:rPr lang="hu-HU" dirty="0" smtClean="0"/>
+              <a:t>”Utolsó” </a:t>
+            </a:r>
+            <a:r>
+              <a:rPr lang="hu-HU" smtClean="0"/>
+              <a:t>számozott kiadás</a:t>
+            </a:r>
+            <a:endParaRPr lang="hu-HU" dirty="0" smtClean="0"/>
+          </a:p>
+          <a:p>
+            <a:endParaRPr lang="hu-HU" dirty="0"/>
+          </a:p>
+        </p:txBody>
+      </p:sp>
+    </p:spTree>
+    <p:extLst>
+      <p:ext uri="{BB962C8B-B14F-4D97-AF65-F5344CB8AC3E}">
+        <p14:creationId xmlns:p14="http://schemas.microsoft.com/office/powerpoint/2010/main" val="385027343"/>
       </p:ext>
     </p:extLst>
   </p:cSld>

</xml_diff>

<commit_message>
market share pie chart hozzáadva
</commit_message>
<xml_diff>
--- a/A Windows történelme.pptx
+++ b/A Windows történelme.pptx
@@ -15,6 +15,8 @@
     <p:sldId id="263" r:id="rId9"/>
     <p:sldId id="264" r:id="rId10"/>
     <p:sldId id="265" r:id="rId11"/>
+    <p:sldId id="267" r:id="rId12"/>
+    <p:sldId id="266" r:id="rId13"/>
   </p:sldIdLst>
   <p:sldSz cx="12192000" cy="6858000"/>
   <p:notesSz cx="6858000" cy="9144000"/>
@@ -121,6 +123,989 @@
 </p:presentation>
 </file>
 
+<file path=ppt/charts/chart1.xml><?xml version="1.0" encoding="utf-8"?>
+<c:chartSpace xmlns:c="http://schemas.openxmlformats.org/drawingml/2006/chart" xmlns:a="http://schemas.openxmlformats.org/drawingml/2006/main" xmlns:r="http://schemas.openxmlformats.org/officeDocument/2006/relationships" xmlns:c16r2="http://schemas.microsoft.com/office/drawing/2015/06/chart">
+  <c:date1904 val="0"/>
+  <c:lang val="hu-HU"/>
+  <c:roundedCorners val="0"/>
+  <mc:AlternateContent xmlns:mc="http://schemas.openxmlformats.org/markup-compatibility/2006">
+    <mc:Choice xmlns:c14="http://schemas.microsoft.com/office/drawing/2007/8/2/chart" Requires="c14">
+      <c14:style val="102"/>
+    </mc:Choice>
+    <mc:Fallback>
+      <c:style val="2"/>
+    </mc:Fallback>
+  </mc:AlternateContent>
+  <c:chart>
+    <c:autoTitleDeleted val="1"/>
+    <c:plotArea>
+      <c:layout/>
+      <c:pieChart>
+        <c:varyColors val="1"/>
+        <c:ser>
+          <c:idx val="0"/>
+          <c:order val="0"/>
+          <c:tx>
+            <c:strRef>
+              <c:f>Munka1!$B$1</c:f>
+              <c:strCache>
+                <c:ptCount val="1"/>
+                <c:pt idx="0">
+                  <c:v>Windows felhasználók száma</c:v>
+                </c:pt>
+              </c:strCache>
+            </c:strRef>
+          </c:tx>
+          <c:dPt>
+            <c:idx val="0"/>
+            <c:bubble3D val="0"/>
+            <c:spPr>
+              <a:solidFill>
+                <a:schemeClr val="accent1"/>
+              </a:solidFill>
+              <a:ln w="19050">
+                <a:solidFill>
+                  <a:schemeClr val="lt1"/>
+                </a:solidFill>
+              </a:ln>
+              <a:effectLst/>
+            </c:spPr>
+            <c:extLst>
+              <c:ext xmlns:c16="http://schemas.microsoft.com/office/drawing/2014/chart" uri="{C3380CC4-5D6E-409C-BE32-E72D297353CC}">
+                <c16:uniqueId val="{00000004-E719-4419-A3A2-E73CC8D5B1E3}"/>
+              </c:ext>
+            </c:extLst>
+          </c:dPt>
+          <c:dPt>
+            <c:idx val="1"/>
+            <c:bubble3D val="0"/>
+            <c:spPr>
+              <a:solidFill>
+                <a:schemeClr val="accent2"/>
+              </a:solidFill>
+              <a:ln w="19050">
+                <a:solidFill>
+                  <a:schemeClr val="lt1"/>
+                </a:solidFill>
+              </a:ln>
+              <a:effectLst/>
+            </c:spPr>
+            <c:extLst>
+              <c:ext xmlns:c16="http://schemas.microsoft.com/office/drawing/2014/chart" uri="{C3380CC4-5D6E-409C-BE32-E72D297353CC}">
+                <c16:uniqueId val="{00000001-E719-4419-A3A2-E73CC8D5B1E3}"/>
+              </c:ext>
+            </c:extLst>
+          </c:dPt>
+          <c:dPt>
+            <c:idx val="2"/>
+            <c:bubble3D val="0"/>
+            <c:spPr>
+              <a:solidFill>
+                <a:schemeClr val="accent3"/>
+              </a:solidFill>
+              <a:ln w="19050">
+                <a:solidFill>
+                  <a:schemeClr val="lt1"/>
+                </a:solidFill>
+              </a:ln>
+              <a:effectLst/>
+            </c:spPr>
+          </c:dPt>
+          <c:dPt>
+            <c:idx val="3"/>
+            <c:bubble3D val="0"/>
+            <c:spPr>
+              <a:solidFill>
+                <a:schemeClr val="accent4"/>
+              </a:solidFill>
+              <a:ln w="19050">
+                <a:solidFill>
+                  <a:schemeClr val="lt1"/>
+                </a:solidFill>
+              </a:ln>
+              <a:effectLst/>
+            </c:spPr>
+            <c:extLst>
+              <c:ext xmlns:c16="http://schemas.microsoft.com/office/drawing/2014/chart" uri="{C3380CC4-5D6E-409C-BE32-E72D297353CC}">
+                <c16:uniqueId val="{00000002-E719-4419-A3A2-E73CC8D5B1E3}"/>
+              </c:ext>
+            </c:extLst>
+          </c:dPt>
+          <c:dPt>
+            <c:idx val="4"/>
+            <c:bubble3D val="0"/>
+            <c:spPr>
+              <a:solidFill>
+                <a:schemeClr val="accent5"/>
+              </a:solidFill>
+              <a:ln w="19050">
+                <a:solidFill>
+                  <a:schemeClr val="lt1"/>
+                </a:solidFill>
+              </a:ln>
+              <a:effectLst/>
+            </c:spPr>
+            <c:extLst>
+              <c:ext xmlns:c16="http://schemas.microsoft.com/office/drawing/2014/chart" uri="{C3380CC4-5D6E-409C-BE32-E72D297353CC}">
+                <c16:uniqueId val="{00000003-E719-4419-A3A2-E73CC8D5B1E3}"/>
+              </c:ext>
+            </c:extLst>
+          </c:dPt>
+          <c:dLbls>
+            <c:dLbl>
+              <c:idx val="0"/>
+              <c:layout>
+                <c:manualLayout>
+                  <c:x val="0.11547368378127261"/>
+                  <c:y val="1.9923012156727836E-2"/>
+                </c:manualLayout>
+              </c:layout>
+              <c:showLegendKey val="0"/>
+              <c:showVal val="1"/>
+              <c:showCatName val="1"/>
+              <c:showSerName val="0"/>
+              <c:showPercent val="0"/>
+              <c:showBubbleSize val="0"/>
+              <c:extLst>
+                <c:ext xmlns:c15="http://schemas.microsoft.com/office/drawing/2012/chart" uri="{CE6537A1-D6FC-4f65-9D91-7224C49458BB}">
+                  <c15:layout/>
+                </c:ext>
+                <c:ext xmlns:c16="http://schemas.microsoft.com/office/drawing/2014/chart" uri="{C3380CC4-5D6E-409C-BE32-E72D297353CC}">
+                  <c16:uniqueId val="{00000004-E719-4419-A3A2-E73CC8D5B1E3}"/>
+                </c:ext>
+              </c:extLst>
+            </c:dLbl>
+            <c:dLbl>
+              <c:idx val="1"/>
+              <c:layout>
+                <c:manualLayout>
+                  <c:x val="-1.5061805457361801E-2"/>
+                  <c:y val="-0.238198225402035"/>
+                </c:manualLayout>
+              </c:layout>
+              <c:showLegendKey val="0"/>
+              <c:showVal val="1"/>
+              <c:showCatName val="1"/>
+              <c:showSerName val="0"/>
+              <c:showPercent val="0"/>
+              <c:showBubbleSize val="0"/>
+              <c:extLst>
+                <c:ext xmlns:c15="http://schemas.microsoft.com/office/drawing/2012/chart" uri="{CE6537A1-D6FC-4f65-9D91-7224C49458BB}">
+                  <c15:layout/>
+                </c:ext>
+                <c:ext xmlns:c16="http://schemas.microsoft.com/office/drawing/2014/chart" uri="{C3380CC4-5D6E-409C-BE32-E72D297353CC}">
+                  <c16:uniqueId val="{00000001-E719-4419-A3A2-E73CC8D5B1E3}"/>
+                </c:ext>
+              </c:extLst>
+            </c:dLbl>
+            <c:dLbl>
+              <c:idx val="3"/>
+              <c:layout>
+                <c:manualLayout>
+                  <c:x val="-6.0411042369703787E-2"/>
+                  <c:y val="2.3714305158492814E-2"/>
+                </c:manualLayout>
+              </c:layout>
+              <c:showLegendKey val="0"/>
+              <c:showVal val="1"/>
+              <c:showCatName val="1"/>
+              <c:showSerName val="0"/>
+              <c:showPercent val="0"/>
+              <c:showBubbleSize val="0"/>
+              <c:extLst>
+                <c:ext xmlns:c15="http://schemas.microsoft.com/office/drawing/2012/chart" uri="{CE6537A1-D6FC-4f65-9D91-7224C49458BB}">
+                  <c15:layout/>
+                </c:ext>
+                <c:ext xmlns:c16="http://schemas.microsoft.com/office/drawing/2014/chart" uri="{C3380CC4-5D6E-409C-BE32-E72D297353CC}">
+                  <c16:uniqueId val="{00000002-E719-4419-A3A2-E73CC8D5B1E3}"/>
+                </c:ext>
+              </c:extLst>
+            </c:dLbl>
+            <c:dLbl>
+              <c:idx val="4"/>
+              <c:layout>
+                <c:manualLayout>
+                  <c:x val="-3.1874077195202598E-4"/>
+                  <c:y val="-8.1462609209101942E-3"/>
+                </c:manualLayout>
+              </c:layout>
+              <c:showLegendKey val="0"/>
+              <c:showVal val="1"/>
+              <c:showCatName val="1"/>
+              <c:showSerName val="0"/>
+              <c:showPercent val="0"/>
+              <c:showBubbleSize val="0"/>
+              <c:extLst>
+                <c:ext xmlns:c15="http://schemas.microsoft.com/office/drawing/2012/chart" uri="{CE6537A1-D6FC-4f65-9D91-7224C49458BB}">
+                  <c15:layout>
+                    <c:manualLayout>
+                      <c:w val="0.13806710323056717"/>
+                      <c:h val="5.9048036423210423E-2"/>
+                    </c:manualLayout>
+                  </c15:layout>
+                </c:ext>
+                <c:ext xmlns:c16="http://schemas.microsoft.com/office/drawing/2014/chart" uri="{C3380CC4-5D6E-409C-BE32-E72D297353CC}">
+                  <c16:uniqueId val="{00000003-E719-4419-A3A2-E73CC8D5B1E3}"/>
+                </c:ext>
+              </c:extLst>
+            </c:dLbl>
+            <c:spPr>
+              <a:noFill/>
+              <a:ln>
+                <a:noFill/>
+              </a:ln>
+              <a:effectLst/>
+            </c:spPr>
+            <c:txPr>
+              <a:bodyPr rot="0" spcFirstLastPara="1" vertOverflow="ellipsis" vert="horz" wrap="square" lIns="38100" tIns="19050" rIns="38100" bIns="19050" anchor="ctr" anchorCtr="1">
+                <a:spAutoFit/>
+              </a:bodyPr>
+              <a:lstStyle/>
+              <a:p>
+                <a:pPr>
+                  <a:defRPr sz="1197" b="0" i="0" u="none" strike="noStrike" kern="1200" baseline="0">
+                    <a:solidFill>
+                      <a:schemeClr val="bg1"/>
+                    </a:solidFill>
+                    <a:latin typeface="+mn-lt"/>
+                    <a:ea typeface="+mn-ea"/>
+                    <a:cs typeface="+mn-cs"/>
+                  </a:defRPr>
+                </a:pPr>
+                <a:endParaRPr lang="hu-HU"/>
+              </a:p>
+            </c:txPr>
+            <c:showLegendKey val="0"/>
+            <c:showVal val="1"/>
+            <c:showCatName val="1"/>
+            <c:showSerName val="0"/>
+            <c:showPercent val="0"/>
+            <c:showBubbleSize val="0"/>
+            <c:showLeaderLines val="1"/>
+            <c:leaderLines>
+              <c:spPr>
+                <a:ln w="9525" cap="flat" cmpd="sng" algn="ctr">
+                  <a:solidFill>
+                    <a:schemeClr val="tx1">
+                      <a:lumMod val="35000"/>
+                      <a:lumOff val="65000"/>
+                    </a:schemeClr>
+                  </a:solidFill>
+                  <a:round/>
+                </a:ln>
+                <a:effectLst/>
+              </c:spPr>
+            </c:leaderLines>
+            <c:extLst>
+              <c:ext xmlns:c15="http://schemas.microsoft.com/office/drawing/2012/chart" uri="{CE6537A1-D6FC-4f65-9D91-7224C49458BB}">
+                <c15:layout/>
+              </c:ext>
+            </c:extLst>
+          </c:dLbls>
+          <c:cat>
+            <c:strRef>
+              <c:f>Munka1!$A$2:$A$6</c:f>
+              <c:strCache>
+                <c:ptCount val="5"/>
+                <c:pt idx="0">
+                  <c:v>Windows 11</c:v>
+                </c:pt>
+                <c:pt idx="1">
+                  <c:v>Windows 10</c:v>
+                </c:pt>
+                <c:pt idx="2">
+                  <c:v>Windows 8.1</c:v>
+                </c:pt>
+                <c:pt idx="3">
+                  <c:v>Windows 7</c:v>
+                </c:pt>
+                <c:pt idx="4">
+                  <c:v>Windows XP</c:v>
+                </c:pt>
+              </c:strCache>
+            </c:strRef>
+          </c:cat>
+          <c:val>
+            <c:numRef>
+              <c:f>Munka1!$B$2:$B$6</c:f>
+              <c:numCache>
+                <c:formatCode>0.00%</c:formatCode>
+                <c:ptCount val="5"/>
+                <c:pt idx="0">
+                  <c:v>0.13070000000000001</c:v>
+                </c:pt>
+                <c:pt idx="1">
+                  <c:v>0.71889999999999998</c:v>
+                </c:pt>
+                <c:pt idx="2">
+                  <c:v>2.7900000000000001E-2</c:v>
+                </c:pt>
+                <c:pt idx="3">
+                  <c:v>0.1106</c:v>
+                </c:pt>
+                <c:pt idx="4">
+                  <c:v>3.8E-3</c:v>
+                </c:pt>
+              </c:numCache>
+            </c:numRef>
+          </c:val>
+          <c:extLst>
+            <c:ext xmlns:c16="http://schemas.microsoft.com/office/drawing/2014/chart" uri="{C3380CC4-5D6E-409C-BE32-E72D297353CC}">
+              <c16:uniqueId val="{00000000-E719-4419-A3A2-E73CC8D5B1E3}"/>
+            </c:ext>
+          </c:extLst>
+        </c:ser>
+        <c:dLbls>
+          <c:showLegendKey val="0"/>
+          <c:showVal val="1"/>
+          <c:showCatName val="1"/>
+          <c:showSerName val="0"/>
+          <c:showPercent val="0"/>
+          <c:showBubbleSize val="0"/>
+          <c:showLeaderLines val="1"/>
+        </c:dLbls>
+        <c:firstSliceAng val="0"/>
+      </c:pieChart>
+      <c:spPr>
+        <a:noFill/>
+        <a:ln>
+          <a:noFill/>
+        </a:ln>
+        <a:effectLst/>
+      </c:spPr>
+    </c:plotArea>
+    <c:plotVisOnly val="1"/>
+    <c:dispBlanksAs val="gap"/>
+    <c:showDLblsOverMax val="0"/>
+  </c:chart>
+  <c:spPr>
+    <a:noFill/>
+    <a:ln>
+      <a:noFill/>
+    </a:ln>
+    <a:effectLst/>
+  </c:spPr>
+  <c:txPr>
+    <a:bodyPr/>
+    <a:lstStyle/>
+    <a:p>
+      <a:pPr>
+        <a:defRPr/>
+      </a:pPr>
+      <a:endParaRPr lang="hu-HU"/>
+    </a:p>
+  </c:txPr>
+  <c:externalData r:id="rId3">
+    <c:autoUpdate val="0"/>
+  </c:externalData>
+  <c:userShapes r:id="rId4"/>
+</c:chartSpace>
+</file>
+
+<file path=ppt/charts/colors1.xml><?xml version="1.0" encoding="utf-8"?>
+<cs:colorStyle xmlns:cs="http://schemas.microsoft.com/office/drawing/2012/chartStyle" xmlns:a="http://schemas.openxmlformats.org/drawingml/2006/main" meth="cycle" id="10">
+  <a:schemeClr val="accent1"/>
+  <a:schemeClr val="accent2"/>
+  <a:schemeClr val="accent3"/>
+  <a:schemeClr val="accent4"/>
+  <a:schemeClr val="accent5"/>
+  <a:schemeClr val="accent6"/>
+  <cs:variation/>
+  <cs:variation>
+    <a:lumMod val="60000"/>
+  </cs:variation>
+  <cs:variation>
+    <a:lumMod val="80000"/>
+    <a:lumOff val="20000"/>
+  </cs:variation>
+  <cs:variation>
+    <a:lumMod val="80000"/>
+  </cs:variation>
+  <cs:variation>
+    <a:lumMod val="60000"/>
+    <a:lumOff val="40000"/>
+  </cs:variation>
+  <cs:variation>
+    <a:lumMod val="50000"/>
+  </cs:variation>
+  <cs:variation>
+    <a:lumMod val="70000"/>
+    <a:lumOff val="30000"/>
+  </cs:variation>
+  <cs:variation>
+    <a:lumMod val="70000"/>
+  </cs:variation>
+  <cs:variation>
+    <a:lumMod val="50000"/>
+    <a:lumOff val="50000"/>
+  </cs:variation>
+</cs:colorStyle>
+</file>
+
+<file path=ppt/charts/style1.xml><?xml version="1.0" encoding="utf-8"?>
+<cs:chartStyle xmlns:cs="http://schemas.microsoft.com/office/drawing/2012/chartStyle" xmlns:a="http://schemas.openxmlformats.org/drawingml/2006/main" id="251">
+  <cs:axisTitle>
+    <cs:lnRef idx="0"/>
+    <cs:fillRef idx="0"/>
+    <cs:effectRef idx="0"/>
+    <cs:fontRef idx="minor">
+      <a:schemeClr val="tx1">
+        <a:lumMod val="65000"/>
+        <a:lumOff val="35000"/>
+      </a:schemeClr>
+    </cs:fontRef>
+    <cs:defRPr sz="1330" kern="1200"/>
+  </cs:axisTitle>
+  <cs:categoryAxis>
+    <cs:lnRef idx="0"/>
+    <cs:fillRef idx="0"/>
+    <cs:effectRef idx="0"/>
+    <cs:fontRef idx="minor">
+      <a:schemeClr val="tx1">
+        <a:lumMod val="65000"/>
+        <a:lumOff val="35000"/>
+      </a:schemeClr>
+    </cs:fontRef>
+    <cs:spPr>
+      <a:ln w="9525" cap="flat" cmpd="sng" algn="ctr">
+        <a:solidFill>
+          <a:schemeClr val="tx1">
+            <a:lumMod val="15000"/>
+            <a:lumOff val="85000"/>
+          </a:schemeClr>
+        </a:solidFill>
+        <a:round/>
+      </a:ln>
+    </cs:spPr>
+    <cs:defRPr sz="1197" kern="1200"/>
+  </cs:categoryAxis>
+  <cs:chartArea mods="allowNoFillOverride allowNoLineOverride">
+    <cs:lnRef idx="0"/>
+    <cs:fillRef idx="0"/>
+    <cs:effectRef idx="0"/>
+    <cs:fontRef idx="minor">
+      <a:schemeClr val="tx1"/>
+    </cs:fontRef>
+    <cs:spPr>
+      <a:solidFill>
+        <a:schemeClr val="bg1"/>
+      </a:solidFill>
+      <a:ln w="9525" cap="flat" cmpd="sng" algn="ctr">
+        <a:solidFill>
+          <a:schemeClr val="tx1">
+            <a:lumMod val="15000"/>
+            <a:lumOff val="85000"/>
+          </a:schemeClr>
+        </a:solidFill>
+        <a:round/>
+      </a:ln>
+    </cs:spPr>
+    <cs:defRPr sz="1197" kern="1200"/>
+  </cs:chartArea>
+  <cs:dataLabel>
+    <cs:lnRef idx="0"/>
+    <cs:fillRef idx="0"/>
+    <cs:effectRef idx="0"/>
+    <cs:fontRef idx="minor">
+      <a:schemeClr val="tx1">
+        <a:lumMod val="75000"/>
+        <a:lumOff val="25000"/>
+      </a:schemeClr>
+    </cs:fontRef>
+    <cs:defRPr sz="1197" kern="1200"/>
+  </cs:dataLabel>
+  <cs:dataLabelCallout>
+    <cs:lnRef idx="0"/>
+    <cs:fillRef idx="0"/>
+    <cs:effectRef idx="0"/>
+    <cs:fontRef idx="minor">
+      <a:schemeClr val="dk1">
+        <a:lumMod val="65000"/>
+        <a:lumOff val="35000"/>
+      </a:schemeClr>
+    </cs:fontRef>
+    <cs:spPr>
+      <a:solidFill>
+        <a:schemeClr val="lt1"/>
+      </a:solidFill>
+      <a:ln>
+        <a:solidFill>
+          <a:schemeClr val="dk1">
+            <a:lumMod val="25000"/>
+            <a:lumOff val="75000"/>
+          </a:schemeClr>
+        </a:solidFill>
+      </a:ln>
+    </cs:spPr>
+    <cs:defRPr sz="1197" kern="1200"/>
+    <cs:bodyPr rot="0" spcFirstLastPara="1" vertOverflow="clip" horzOverflow="clip" vert="horz" wrap="square" lIns="36576" tIns="18288" rIns="36576" bIns="18288" anchor="ctr" anchorCtr="1">
+      <a:spAutoFit/>
+    </cs:bodyPr>
+  </cs:dataLabelCallout>
+  <cs:dataPoint>
+    <cs:lnRef idx="0"/>
+    <cs:fillRef idx="1">
+      <cs:styleClr val="auto"/>
+    </cs:fillRef>
+    <cs:effectRef idx="0"/>
+    <cs:fontRef idx="minor">
+      <a:schemeClr val="tx1"/>
+    </cs:fontRef>
+    <cs:spPr>
+      <a:ln w="19050">
+        <a:solidFill>
+          <a:schemeClr val="lt1"/>
+        </a:solidFill>
+      </a:ln>
+    </cs:spPr>
+  </cs:dataPoint>
+  <cs:dataPoint3D>
+    <cs:lnRef idx="0"/>
+    <cs:fillRef idx="1">
+      <cs:styleClr val="auto"/>
+    </cs:fillRef>
+    <cs:effectRef idx="0"/>
+    <cs:fontRef idx="minor">
+      <a:schemeClr val="tx1"/>
+    </cs:fontRef>
+    <cs:spPr>
+      <a:ln w="25400">
+        <a:solidFill>
+          <a:schemeClr val="lt1"/>
+        </a:solidFill>
+      </a:ln>
+    </cs:spPr>
+  </cs:dataPoint3D>
+  <cs:dataPointLine>
+    <cs:lnRef idx="0">
+      <cs:styleClr val="auto"/>
+    </cs:lnRef>
+    <cs:fillRef idx="0"/>
+    <cs:effectRef idx="0"/>
+    <cs:fontRef idx="minor">
+      <a:schemeClr val="tx1"/>
+    </cs:fontRef>
+    <cs:spPr>
+      <a:ln w="28575" cap="rnd">
+        <a:solidFill>
+          <a:schemeClr val="phClr"/>
+        </a:solidFill>
+        <a:round/>
+      </a:ln>
+    </cs:spPr>
+  </cs:dataPointLine>
+  <cs:dataPointMarker>
+    <cs:lnRef idx="0">
+      <cs:styleClr val="auto"/>
+    </cs:lnRef>
+    <cs:fillRef idx="1">
+      <cs:styleClr val="auto"/>
+    </cs:fillRef>
+    <cs:effectRef idx="0"/>
+    <cs:fontRef idx="minor">
+      <a:schemeClr val="tx1"/>
+    </cs:fontRef>
+    <cs:spPr>
+      <a:ln w="9525">
+        <a:solidFill>
+          <a:schemeClr val="phClr"/>
+        </a:solidFill>
+      </a:ln>
+    </cs:spPr>
+  </cs:dataPointMarker>
+  <cs:dataPointMarkerLayout symbol="circle" size="5"/>
+  <cs:dataPointWireframe>
+    <cs:lnRef idx="0">
+      <cs:styleClr val="auto"/>
+    </cs:lnRef>
+    <cs:fillRef idx="0"/>
+    <cs:effectRef idx="0"/>
+    <cs:fontRef idx="minor">
+      <a:schemeClr val="tx1"/>
+    </cs:fontRef>
+    <cs:spPr>
+      <a:ln w="9525" cap="rnd">
+        <a:solidFill>
+          <a:schemeClr val="phClr"/>
+        </a:solidFill>
+        <a:round/>
+      </a:ln>
+    </cs:spPr>
+  </cs:dataPointWireframe>
+  <cs:dataTable>
+    <cs:lnRef idx="0"/>
+    <cs:fillRef idx="0"/>
+    <cs:effectRef idx="0"/>
+    <cs:fontRef idx="minor">
+      <a:schemeClr val="tx1">
+        <a:lumMod val="65000"/>
+        <a:lumOff val="35000"/>
+      </a:schemeClr>
+    </cs:fontRef>
+    <cs:spPr>
+      <a:noFill/>
+      <a:ln w="9525" cap="flat" cmpd="sng" algn="ctr">
+        <a:solidFill>
+          <a:schemeClr val="tx1">
+            <a:lumMod val="15000"/>
+            <a:lumOff val="85000"/>
+          </a:schemeClr>
+        </a:solidFill>
+        <a:round/>
+      </a:ln>
+    </cs:spPr>
+    <cs:defRPr sz="1197" kern="1200"/>
+  </cs:dataTable>
+  <cs:downBar>
+    <cs:lnRef idx="0"/>
+    <cs:fillRef idx="0"/>
+    <cs:effectRef idx="0"/>
+    <cs:fontRef idx="minor">
+      <a:schemeClr val="tx1"/>
+    </cs:fontRef>
+    <cs:spPr>
+      <a:solidFill>
+        <a:schemeClr val="dk1">
+          <a:lumMod val="75000"/>
+          <a:lumOff val="25000"/>
+        </a:schemeClr>
+      </a:solidFill>
+      <a:ln w="9525" cap="flat" cmpd="sng" algn="ctr">
+        <a:solidFill>
+          <a:schemeClr val="tx1">
+            <a:lumMod val="65000"/>
+            <a:lumOff val="35000"/>
+          </a:schemeClr>
+        </a:solidFill>
+        <a:round/>
+      </a:ln>
+    </cs:spPr>
+  </cs:downBar>
+  <cs:dropLine>
+    <cs:lnRef idx="0"/>
+    <cs:fillRef idx="0"/>
+    <cs:effectRef idx="0"/>
+    <cs:fontRef idx="minor">
+      <a:schemeClr val="tx1"/>
+    </cs:fontRef>
+    <cs:spPr>
+      <a:ln w="9525" cap="flat" cmpd="sng" algn="ctr">
+        <a:solidFill>
+          <a:schemeClr val="tx1">
+            <a:lumMod val="35000"/>
+            <a:lumOff val="65000"/>
+          </a:schemeClr>
+        </a:solidFill>
+        <a:round/>
+      </a:ln>
+    </cs:spPr>
+  </cs:dropLine>
+  <cs:errorBar>
+    <cs:lnRef idx="0"/>
+    <cs:fillRef idx="0"/>
+    <cs:effectRef idx="0"/>
+    <cs:fontRef idx="minor">
+      <a:schemeClr val="tx1"/>
+    </cs:fontRef>
+    <cs:spPr>
+      <a:ln w="9525" cap="flat" cmpd="sng" algn="ctr">
+        <a:solidFill>
+          <a:schemeClr val="tx1">
+            <a:lumMod val="65000"/>
+            <a:lumOff val="35000"/>
+          </a:schemeClr>
+        </a:solidFill>
+        <a:round/>
+      </a:ln>
+    </cs:spPr>
+  </cs:errorBar>
+  <cs:floor>
+    <cs:lnRef idx="0"/>
+    <cs:fillRef idx="0"/>
+    <cs:effectRef idx="0"/>
+    <cs:fontRef idx="minor">
+      <a:schemeClr val="tx1"/>
+    </cs:fontRef>
+    <cs:spPr>
+      <a:noFill/>
+      <a:ln>
+        <a:noFill/>
+      </a:ln>
+    </cs:spPr>
+  </cs:floor>
+  <cs:gridlineMajor>
+    <cs:lnRef idx="0"/>
+    <cs:fillRef idx="0"/>
+    <cs:effectRef idx="0"/>
+    <cs:fontRef idx="minor">
+      <a:schemeClr val="tx1"/>
+    </cs:fontRef>
+    <cs:spPr>
+      <a:ln w="9525" cap="flat" cmpd="sng" algn="ctr">
+        <a:solidFill>
+          <a:schemeClr val="tx1">
+            <a:lumMod val="15000"/>
+            <a:lumOff val="85000"/>
+          </a:schemeClr>
+        </a:solidFill>
+        <a:round/>
+      </a:ln>
+    </cs:spPr>
+  </cs:gridlineMajor>
+  <cs:gridlineMinor>
+    <cs:lnRef idx="0"/>
+    <cs:fillRef idx="0"/>
+    <cs:effectRef idx="0"/>
+    <cs:fontRef idx="minor">
+      <a:schemeClr val="tx1"/>
+    </cs:fontRef>
+    <cs:spPr>
+      <a:ln w="9525" cap="flat" cmpd="sng" algn="ctr">
+        <a:solidFill>
+          <a:schemeClr val="tx1">
+            <a:lumMod val="5000"/>
+            <a:lumOff val="95000"/>
+          </a:schemeClr>
+        </a:solidFill>
+        <a:round/>
+      </a:ln>
+    </cs:spPr>
+  </cs:gridlineMinor>
+  <cs:hiLoLine>
+    <cs:lnRef idx="0"/>
+    <cs:fillRef idx="0"/>
+    <cs:effectRef idx="0"/>
+    <cs:fontRef idx="minor">
+      <a:schemeClr val="tx1"/>
+    </cs:fontRef>
+    <cs:spPr>
+      <a:ln w="9525" cap="flat" cmpd="sng" algn="ctr">
+        <a:solidFill>
+          <a:schemeClr val="tx1">
+            <a:lumMod val="50000"/>
+            <a:lumOff val="50000"/>
+          </a:schemeClr>
+        </a:solidFill>
+        <a:round/>
+      </a:ln>
+    </cs:spPr>
+  </cs:hiLoLine>
+  <cs:leaderLine>
+    <cs:lnRef idx="0"/>
+    <cs:fillRef idx="0"/>
+    <cs:effectRef idx="0"/>
+    <cs:fontRef idx="minor">
+      <a:schemeClr val="tx1"/>
+    </cs:fontRef>
+    <cs:spPr>
+      <a:ln w="9525" cap="flat" cmpd="sng" algn="ctr">
+        <a:solidFill>
+          <a:schemeClr val="tx1">
+            <a:lumMod val="35000"/>
+            <a:lumOff val="65000"/>
+          </a:schemeClr>
+        </a:solidFill>
+        <a:round/>
+      </a:ln>
+    </cs:spPr>
+  </cs:leaderLine>
+  <cs:legend>
+    <cs:lnRef idx="0"/>
+    <cs:fillRef idx="0"/>
+    <cs:effectRef idx="0"/>
+    <cs:fontRef idx="minor">
+      <a:schemeClr val="tx1">
+        <a:lumMod val="65000"/>
+        <a:lumOff val="35000"/>
+      </a:schemeClr>
+    </cs:fontRef>
+    <cs:defRPr sz="1197" kern="1200"/>
+  </cs:legend>
+  <cs:plotArea mods="allowNoFillOverride allowNoLineOverride">
+    <cs:lnRef idx="0"/>
+    <cs:fillRef idx="0"/>
+    <cs:effectRef idx="0"/>
+    <cs:fontRef idx="minor">
+      <a:schemeClr val="tx1"/>
+    </cs:fontRef>
+  </cs:plotArea>
+  <cs:plotArea3D mods="allowNoFillOverride allowNoLineOverride">
+    <cs:lnRef idx="0"/>
+    <cs:fillRef idx="0"/>
+    <cs:effectRef idx="0"/>
+    <cs:fontRef idx="minor">
+      <a:schemeClr val="tx1"/>
+    </cs:fontRef>
+  </cs:plotArea3D>
+  <cs:seriesAxis>
+    <cs:lnRef idx="0"/>
+    <cs:fillRef idx="0"/>
+    <cs:effectRef idx="0"/>
+    <cs:fontRef idx="minor">
+      <a:schemeClr val="tx1">
+        <a:lumMod val="65000"/>
+        <a:lumOff val="35000"/>
+      </a:schemeClr>
+    </cs:fontRef>
+    <cs:defRPr sz="1197" kern="1200"/>
+  </cs:seriesAxis>
+  <cs:seriesLine>
+    <cs:lnRef idx="0"/>
+    <cs:fillRef idx="0"/>
+    <cs:effectRef idx="0"/>
+    <cs:fontRef idx="minor">
+      <a:schemeClr val="tx1"/>
+    </cs:fontRef>
+    <cs:spPr>
+      <a:ln w="9525" cap="flat" cmpd="sng" algn="ctr">
+        <a:solidFill>
+          <a:schemeClr val="tx1">
+            <a:lumMod val="35000"/>
+            <a:lumOff val="65000"/>
+          </a:schemeClr>
+        </a:solidFill>
+        <a:round/>
+      </a:ln>
+    </cs:spPr>
+  </cs:seriesLine>
+  <cs:title>
+    <cs:lnRef idx="0"/>
+    <cs:fillRef idx="0"/>
+    <cs:effectRef idx="0"/>
+    <cs:fontRef idx="minor">
+      <a:schemeClr val="tx1">
+        <a:lumMod val="65000"/>
+        <a:lumOff val="35000"/>
+      </a:schemeClr>
+    </cs:fontRef>
+    <cs:defRPr sz="1862" b="0" kern="1200" spc="0" baseline="0"/>
+  </cs:title>
+  <cs:trendline>
+    <cs:lnRef idx="0">
+      <cs:styleClr val="auto"/>
+    </cs:lnRef>
+    <cs:fillRef idx="0"/>
+    <cs:effectRef idx="0"/>
+    <cs:fontRef idx="minor">
+      <a:schemeClr val="tx1"/>
+    </cs:fontRef>
+    <cs:spPr>
+      <a:ln w="19050" cap="rnd">
+        <a:solidFill>
+          <a:schemeClr val="phClr"/>
+        </a:solidFill>
+        <a:prstDash val="sysDot"/>
+      </a:ln>
+    </cs:spPr>
+  </cs:trendline>
+  <cs:trendlineLabel>
+    <cs:lnRef idx="0"/>
+    <cs:fillRef idx="0"/>
+    <cs:effectRef idx="0"/>
+    <cs:fontRef idx="minor">
+      <a:schemeClr val="tx1">
+        <a:lumMod val="65000"/>
+        <a:lumOff val="35000"/>
+      </a:schemeClr>
+    </cs:fontRef>
+    <cs:defRPr sz="1197" kern="1200"/>
+  </cs:trendlineLabel>
+  <cs:upBar>
+    <cs:lnRef idx="0"/>
+    <cs:fillRef idx="0"/>
+    <cs:effectRef idx="0"/>
+    <cs:fontRef idx="minor">
+      <a:schemeClr val="tx1"/>
+    </cs:fontRef>
+    <cs:spPr>
+      <a:solidFill>
+        <a:schemeClr val="lt1"/>
+      </a:solidFill>
+      <a:ln w="9525" cap="flat" cmpd="sng" algn="ctr">
+        <a:solidFill>
+          <a:schemeClr val="tx1">
+            <a:lumMod val="65000"/>
+            <a:lumOff val="35000"/>
+          </a:schemeClr>
+        </a:solidFill>
+        <a:round/>
+      </a:ln>
+    </cs:spPr>
+  </cs:upBar>
+  <cs:valueAxis>
+    <cs:lnRef idx="0"/>
+    <cs:fillRef idx="0"/>
+    <cs:effectRef idx="0"/>
+    <cs:fontRef idx="minor">
+      <a:schemeClr val="tx1">
+        <a:lumMod val="65000"/>
+        <a:lumOff val="35000"/>
+      </a:schemeClr>
+    </cs:fontRef>
+    <cs:defRPr sz="1197" kern="1200"/>
+  </cs:valueAxis>
+  <cs:wall>
+    <cs:lnRef idx="0"/>
+    <cs:fillRef idx="0"/>
+    <cs:effectRef idx="0"/>
+    <cs:fontRef idx="minor">
+      <a:schemeClr val="tx1"/>
+    </cs:fontRef>
+    <cs:spPr>
+      <a:noFill/>
+      <a:ln>
+        <a:noFill/>
+      </a:ln>
+    </cs:spPr>
+  </cs:wall>
+</cs:chartStyle>
+</file>
+
+<file path=ppt/drawings/drawing1.xml><?xml version="1.0" encoding="utf-8"?>
+<c:userShapes xmlns:c="http://schemas.openxmlformats.org/drawingml/2006/chart">
+  <cdr:relSizeAnchor xmlns:cdr="http://schemas.openxmlformats.org/drawingml/2006/chartDrawing">
+    <cdr:from>
+      <cdr:x>0.63072</cdr:x>
+      <cdr:y>0.80663</cdr:y>
+    </cdr:from>
+    <cdr:to>
+      <cdr:x>0.71744</cdr:x>
+      <cdr:y>0.98349</cdr:y>
+    </cdr:to>
+    <cdr:sp macro="" textlink="">
+      <cdr:nvSpPr>
+        <cdr:cNvPr id="2" name="Szövegdoboz 1"/>
+        <cdr:cNvSpPr txBox="1"/>
+      </cdr:nvSpPr>
+      <cdr:spPr>
+        <a:xfrm xmlns:a="http://schemas.openxmlformats.org/drawingml/2006/main">
+          <a:off x="6650736" y="4170340"/>
+          <a:ext cx="914400" cy="914400"/>
+        </a:xfrm>
+        <a:prstGeom xmlns:a="http://schemas.openxmlformats.org/drawingml/2006/main" prst="rect">
+          <a:avLst/>
+        </a:prstGeom>
+      </cdr:spPr>
+      <cdr:txBody>
+        <a:bodyPr xmlns:a="http://schemas.openxmlformats.org/drawingml/2006/main" vertOverflow="clip" wrap="none" rtlCol="0"/>
+        <a:lstStyle xmlns:a="http://schemas.openxmlformats.org/drawingml/2006/main"/>
+        <a:p xmlns:a="http://schemas.openxmlformats.org/drawingml/2006/main">
+          <a:r>
+            <a:rPr lang="hu-HU" dirty="0" err="1"/>
+            <a:t>Forrás:https</a:t>
+          </a:r>
+          <a:r>
+            <a:rPr lang="hu-HU" dirty="0"/>
+            <a:t>://bit.ly/3BToWCm</a:t>
+          </a:r>
+          <a:endParaRPr lang="hu-HU" sz="1100" dirty="0"/>
+        </a:p>
+      </cdr:txBody>
+    </cdr:sp>
+  </cdr:relSizeAnchor>
+</c:userShapes>
+</file>
+
 <file path=ppt/slideLayouts/slideLayout1.xml><?xml version="1.0" encoding="utf-8"?>
 <p:sldLayout xmlns:a="http://schemas.openxmlformats.org/drawingml/2006/main" xmlns:r="http://schemas.openxmlformats.org/officeDocument/2006/relationships" xmlns:p="http://schemas.openxmlformats.org/presentationml/2006/main" showMasterSp="0" type="title" preserve="1">
   <p:cSld name="Címdia">
@@ -313,7 +1298,7 @@
             <a:fld id="{B61BEF0D-F0BB-DE4B-95CE-6DB70DBA9567}" type="datetimeFigureOut">
               <a:rPr lang="en-US" dirty="0"/>
               <a:pPr/>
-              <a:t>9/15/2022</a:t>
+              <a:t>9/20/2022</a:t>
             </a:fld>
             <a:endParaRPr lang="en-US" dirty="0"/>
           </a:p>
@@ -746,7 +1731,7 @@
             <a:fld id="{B61BEF0D-F0BB-DE4B-95CE-6DB70DBA9567}" type="datetimeFigureOut">
               <a:rPr lang="en-US" dirty="0"/>
               <a:pPr/>
-              <a:t>9/15/2022</a:t>
+              <a:t>9/20/2022</a:t>
             </a:fld>
             <a:endParaRPr lang="en-US" dirty="0"/>
           </a:p>
@@ -993,7 +1978,7 @@
             <a:fld id="{B61BEF0D-F0BB-DE4B-95CE-6DB70DBA9567}" type="datetimeFigureOut">
               <a:rPr lang="en-US" dirty="0"/>
               <a:pPr/>
-              <a:t>9/15/2022</a:t>
+              <a:t>9/20/2022</a:t>
             </a:fld>
             <a:endParaRPr lang="en-US" dirty="0"/>
           </a:p>
@@ -1298,7 +2283,7 @@
             <a:fld id="{B61BEF0D-F0BB-DE4B-95CE-6DB70DBA9567}" type="datetimeFigureOut">
               <a:rPr lang="en-US" dirty="0"/>
               <a:pPr/>
-              <a:t>9/15/2022</a:t>
+              <a:t>9/20/2022</a:t>
             </a:fld>
             <a:endParaRPr lang="en-US" dirty="0"/>
           </a:p>
@@ -1613,7 +2598,7 @@
             <a:fld id="{B61BEF0D-F0BB-DE4B-95CE-6DB70DBA9567}" type="datetimeFigureOut">
               <a:rPr lang="en-US" dirty="0"/>
               <a:pPr/>
-              <a:t>9/15/2022</a:t>
+              <a:t>9/20/2022</a:t>
             </a:fld>
             <a:endParaRPr lang="en-US" dirty="0"/>
           </a:p>
@@ -1912,7 +2897,7 @@
             <a:fld id="{B61BEF0D-F0BB-DE4B-95CE-6DB70DBA9567}" type="datetimeFigureOut">
               <a:rPr lang="en-US" dirty="0"/>
               <a:pPr/>
-              <a:t>9/15/2022</a:t>
+              <a:t>9/20/2022</a:t>
             </a:fld>
             <a:endParaRPr lang="en-US" dirty="0"/>
           </a:p>
@@ -2276,7 +3261,7 @@
             <a:fld id="{B61BEF0D-F0BB-DE4B-95CE-6DB70DBA9567}" type="datetimeFigureOut">
               <a:rPr lang="en-US" dirty="0"/>
               <a:pPr/>
-              <a:t>9/15/2022</a:t>
+              <a:t>9/20/2022</a:t>
             </a:fld>
             <a:endParaRPr lang="en-US" dirty="0"/>
           </a:p>
@@ -2447,7 +3432,7 @@
             <a:fld id="{B61BEF0D-F0BB-DE4B-95CE-6DB70DBA9567}" type="datetimeFigureOut">
               <a:rPr lang="en-US" dirty="0"/>
               <a:pPr/>
-              <a:t>9/15/2022</a:t>
+              <a:t>9/20/2022</a:t>
             </a:fld>
             <a:endParaRPr lang="en-US" dirty="0"/>
           </a:p>
@@ -2624,7 +3609,7 @@
             <a:fld id="{B61BEF0D-F0BB-DE4B-95CE-6DB70DBA9567}" type="datetimeFigureOut">
               <a:rPr lang="en-US" dirty="0"/>
               <a:pPr/>
-              <a:t>9/15/2022</a:t>
+              <a:t>9/20/2022</a:t>
             </a:fld>
             <a:endParaRPr lang="en-US" dirty="0"/>
           </a:p>
@@ -2791,7 +3776,7 @@
             <a:fld id="{B61BEF0D-F0BB-DE4B-95CE-6DB70DBA9567}" type="datetimeFigureOut">
               <a:rPr lang="en-US" dirty="0"/>
               <a:pPr/>
-              <a:t>9/15/2022</a:t>
+              <a:t>9/20/2022</a:t>
             </a:fld>
             <a:endParaRPr lang="en-US" dirty="0"/>
           </a:p>
@@ -3038,7 +4023,7 @@
             <a:fld id="{B61BEF0D-F0BB-DE4B-95CE-6DB70DBA9567}" type="datetimeFigureOut">
               <a:rPr lang="en-US" dirty="0"/>
               <a:pPr/>
-              <a:t>9/15/2022</a:t>
+              <a:t>9/20/2022</a:t>
             </a:fld>
             <a:endParaRPr lang="en-US" dirty="0"/>
           </a:p>
@@ -3271,7 +4256,7 @@
             <a:fld id="{B61BEF0D-F0BB-DE4B-95CE-6DB70DBA9567}" type="datetimeFigureOut">
               <a:rPr lang="en-US" dirty="0"/>
               <a:pPr/>
-              <a:t>9/15/2022</a:t>
+              <a:t>9/20/2022</a:t>
             </a:fld>
             <a:endParaRPr lang="en-US" dirty="0"/>
           </a:p>
@@ -3650,7 +4635,7 @@
             <a:fld id="{B61BEF0D-F0BB-DE4B-95CE-6DB70DBA9567}" type="datetimeFigureOut">
               <a:rPr lang="en-US" dirty="0"/>
               <a:pPr/>
-              <a:t>9/15/2022</a:t>
+              <a:t>9/20/2022</a:t>
             </a:fld>
             <a:endParaRPr lang="en-US" dirty="0"/>
           </a:p>
@@ -3765,7 +4750,7 @@
             <a:fld id="{B61BEF0D-F0BB-DE4B-95CE-6DB70DBA9567}" type="datetimeFigureOut">
               <a:rPr lang="en-US" dirty="0"/>
               <a:pPr/>
-              <a:t>9/15/2022</a:t>
+              <a:t>9/20/2022</a:t>
             </a:fld>
             <a:endParaRPr lang="en-US" dirty="0"/>
           </a:p>
@@ -3857,7 +4842,7 @@
             <a:fld id="{B61BEF0D-F0BB-DE4B-95CE-6DB70DBA9567}" type="datetimeFigureOut">
               <a:rPr lang="en-US" dirty="0"/>
               <a:pPr/>
-              <a:t>9/15/2022</a:t>
+              <a:t>9/20/2022</a:t>
             </a:fld>
             <a:endParaRPr lang="en-US" dirty="0"/>
           </a:p>
@@ -4109,7 +5094,7 @@
             <a:fld id="{B61BEF0D-F0BB-DE4B-95CE-6DB70DBA9567}" type="datetimeFigureOut">
               <a:rPr lang="en-US" dirty="0"/>
               <a:pPr/>
-              <a:t>9/15/2022</a:t>
+              <a:t>9/20/2022</a:t>
             </a:fld>
             <a:endParaRPr lang="en-US" dirty="0"/>
           </a:p>
@@ -4389,7 +5374,7 @@
             <a:fld id="{B61BEF0D-F0BB-DE4B-95CE-6DB70DBA9567}" type="datetimeFigureOut">
               <a:rPr lang="en-US" dirty="0"/>
               <a:pPr/>
-              <a:t>9/15/2022</a:t>
+              <a:t>9/20/2022</a:t>
             </a:fld>
             <a:endParaRPr lang="en-US" dirty="0"/>
           </a:p>
@@ -4792,7 +5777,7 @@
             <a:fld id="{B61BEF0D-F0BB-DE4B-95CE-6DB70DBA9567}" type="datetimeFigureOut">
               <a:rPr lang="en-US" dirty="0"/>
               <a:pPr/>
-              <a:t>9/15/2022</a:t>
+              <a:t>9/20/2022</a:t>
             </a:fld>
             <a:endParaRPr lang="en-US" dirty="0"/>
           </a:p>
@@ -5469,6 +6454,161 @@
 </p:sld>
 </file>
 
+<file path=ppt/slides/slide11.xml><?xml version="1.0" encoding="utf-8"?>
+<p:sld xmlns:a="http://schemas.openxmlformats.org/drawingml/2006/main" xmlns:r="http://schemas.openxmlformats.org/officeDocument/2006/relationships" xmlns:p="http://schemas.openxmlformats.org/presentationml/2006/main">
+  <p:cSld>
+    <p:spTree>
+      <p:nvGrpSpPr>
+        <p:cNvPr id="1" name=""/>
+        <p:cNvGrpSpPr/>
+        <p:nvPr/>
+      </p:nvGrpSpPr>
+      <p:grpSpPr>
+        <a:xfrm>
+          <a:off x="0" y="0"/>
+          <a:ext cx="0" cy="0"/>
+          <a:chOff x="0" y="0"/>
+          <a:chExt cx="0" cy="0"/>
+        </a:xfrm>
+      </p:grpSpPr>
+      <p:sp>
+        <p:nvSpPr>
+          <p:cNvPr id="2" name="Cím 1"/>
+          <p:cNvSpPr>
+            <a:spLocks noGrp="1"/>
+          </p:cNvSpPr>
+          <p:nvPr>
+            <p:ph type="title"/>
+          </p:nvPr>
+        </p:nvSpPr>
+        <p:spPr>
+          <a:xfrm>
+            <a:off x="428180" y="5279812"/>
+            <a:ext cx="8534400" cy="1507067"/>
+          </a:xfrm>
+        </p:spPr>
+        <p:txBody>
+          <a:bodyPr/>
+          <a:lstStyle/>
+          <a:p>
+            <a:r>
+              <a:rPr lang="hu-HU" dirty="0" smtClean="0"/>
+              <a:t>Mennyien használják?</a:t>
+            </a:r>
+            <a:endParaRPr lang="hu-HU" dirty="0"/>
+          </a:p>
+        </p:txBody>
+      </p:sp>
+      <p:graphicFrame>
+        <p:nvGraphicFramePr>
+          <p:cNvPr id="10" name="Tartalom helye 9"/>
+          <p:cNvGraphicFramePr>
+            <a:graphicFrameLocks noGrp="1"/>
+          </p:cNvGraphicFramePr>
+          <p:nvPr>
+            <p:ph idx="1"/>
+            <p:extLst>
+              <p:ext uri="{D42A27DB-BD31-4B8C-83A1-F6EECF244321}">
+                <p14:modId xmlns:p14="http://schemas.microsoft.com/office/powerpoint/2010/main" val="1092687453"/>
+              </p:ext>
+            </p:extLst>
+          </p:nvPr>
+        </p:nvGraphicFramePr>
+        <p:xfrm>
+          <a:off x="854900" y="524256"/>
+          <a:ext cx="10544619" cy="5170084"/>
+        </p:xfrm>
+        <a:graphic>
+          <a:graphicData uri="http://schemas.openxmlformats.org/drawingml/2006/chart">
+            <c:chart xmlns:c="http://schemas.openxmlformats.org/drawingml/2006/chart" xmlns:r="http://schemas.openxmlformats.org/officeDocument/2006/relationships" r:id="rId2"/>
+          </a:graphicData>
+        </a:graphic>
+      </p:graphicFrame>
+    </p:spTree>
+    <p:extLst>
+      <p:ext uri="{BB962C8B-B14F-4D97-AF65-F5344CB8AC3E}">
+        <p14:creationId xmlns:p14="http://schemas.microsoft.com/office/powerpoint/2010/main" val="472965371"/>
+      </p:ext>
+    </p:extLst>
+  </p:cSld>
+  <p:clrMapOvr>
+    <a:masterClrMapping/>
+  </p:clrMapOvr>
+</p:sld>
+</file>
+
+<file path=ppt/slides/slide12.xml><?xml version="1.0" encoding="utf-8"?>
+<p:sld xmlns:a="http://schemas.openxmlformats.org/drawingml/2006/main" xmlns:r="http://schemas.openxmlformats.org/officeDocument/2006/relationships" xmlns:p="http://schemas.openxmlformats.org/presentationml/2006/main">
+  <p:cSld>
+    <p:spTree>
+      <p:nvGrpSpPr>
+        <p:cNvPr id="1" name=""/>
+        <p:cNvGrpSpPr/>
+        <p:nvPr/>
+      </p:nvGrpSpPr>
+      <p:grpSpPr>
+        <a:xfrm>
+          <a:off x="0" y="0"/>
+          <a:ext cx="0" cy="0"/>
+          <a:chOff x="0" y="0"/>
+          <a:chExt cx="0" cy="0"/>
+        </a:xfrm>
+      </p:grpSpPr>
+      <p:sp>
+        <p:nvSpPr>
+          <p:cNvPr id="2" name="Cím 1"/>
+          <p:cNvSpPr>
+            <a:spLocks noGrp="1"/>
+          </p:cNvSpPr>
+          <p:nvPr>
+            <p:ph type="title"/>
+          </p:nvPr>
+        </p:nvSpPr>
+        <p:spPr/>
+        <p:txBody>
+          <a:bodyPr/>
+          <a:lstStyle/>
+          <a:p>
+            <a:r>
+              <a:rPr lang="hu-HU" dirty="0" smtClean="0"/>
+              <a:t>Köszönöm a figyelmet!</a:t>
+            </a:r>
+            <a:endParaRPr lang="hu-HU" dirty="0"/>
+          </a:p>
+        </p:txBody>
+      </p:sp>
+      <p:sp>
+        <p:nvSpPr>
+          <p:cNvPr id="3" name="Tartalom helye 2"/>
+          <p:cNvSpPr>
+            <a:spLocks noGrp="1"/>
+          </p:cNvSpPr>
+          <p:nvPr>
+            <p:ph idx="1"/>
+          </p:nvPr>
+        </p:nvSpPr>
+        <p:spPr/>
+        <p:txBody>
+          <a:bodyPr/>
+          <a:lstStyle/>
+          <a:p>
+            <a:endParaRPr lang="hu-HU"/>
+          </a:p>
+        </p:txBody>
+      </p:sp>
+    </p:spTree>
+    <p:extLst>
+      <p:ext uri="{BB962C8B-B14F-4D97-AF65-F5344CB8AC3E}">
+        <p14:creationId xmlns:p14="http://schemas.microsoft.com/office/powerpoint/2010/main" val="3768734854"/>
+      </p:ext>
+    </p:extLst>
+  </p:cSld>
+  <p:clrMapOvr>
+    <a:masterClrMapping/>
+  </p:clrMapOvr>
+</p:sld>
+</file>
+
 <file path=ppt/slides/slide2.xml><?xml version="1.0" encoding="utf-8"?>
 <p:sld xmlns:a="http://schemas.openxmlformats.org/drawingml/2006/main" xmlns:r="http://schemas.openxmlformats.org/officeDocument/2006/relationships" xmlns:p="http://schemas.openxmlformats.org/presentationml/2006/main">
   <p:cSld>
@@ -5602,13 +6742,8 @@
           <a:p>
             <a:r>
               <a:rPr lang="hu-HU" sz="1000" dirty="0"/>
-              <a:t>Forrás</a:t>
-            </a:r>
-            <a:r>
-              <a:rPr lang="hu-HU" sz="1000" dirty="0"/>
-              <a:t>: https://bit.ly/3eLHgEt</a:t>
-            </a:r>
-            <a:endParaRPr lang="hu-HU" sz="1000" dirty="0"/>
+              <a:t>Forrás: https://bit.ly/3eLHgEt</a:t>
+            </a:r>
           </a:p>
         </p:txBody>
       </p:sp>
@@ -5694,11 +6829,7 @@
           <a:p>
             <a:r>
               <a:rPr lang="hu-HU" dirty="0" smtClean="0"/>
-              <a:t>Első nagy </a:t>
-            </a:r>
-            <a:r>
-              <a:rPr lang="hu-HU" dirty="0" smtClean="0"/>
-              <a:t>siker</a:t>
+              <a:t>Első nagy siker</a:t>
             </a:r>
           </a:p>
           <a:p>
@@ -5706,7 +6837,6 @@
               <a:rPr lang="hu-HU" dirty="0" smtClean="0"/>
               <a:t>Start menü</a:t>
             </a:r>
-            <a:endParaRPr lang="hu-HU" dirty="0" smtClean="0"/>
           </a:p>
           <a:p>
             <a:r>
@@ -5773,7 +6903,6 @@
               <a:rPr lang="hu-HU" sz="1000" dirty="0"/>
               <a:t>Forrás: https://bit.ly/3U7mlfv</a:t>
             </a:r>
-            <a:endParaRPr lang="hu-HU" sz="1000" dirty="0"/>
           </a:p>
         </p:txBody>
       </p:sp>

</xml_diff>

<commit_message>
Tartalmi hibák javítása. Diák átláthatóvá tétele
</commit_message>
<xml_diff>
--- a/A Windows történelme.pptx
+++ b/A Windows történelme.pptx
@@ -363,7 +363,7 @@
               <a:lstStyle/>
               <a:p>
                 <a:pPr>
-                  <a:defRPr sz="1197" b="0" i="0" u="none" strike="noStrike" kern="1200" baseline="0">
+                  <a:defRPr sz="1100" b="0" i="0" u="none" strike="noStrike" kern="1200" baseline="0">
                     <a:solidFill>
                       <a:schemeClr val="bg1"/>
                     </a:solidFill>
@@ -6424,8 +6424,13 @@
           <a:p>
             <a:r>
               <a:rPr lang="hu-HU" dirty="0" smtClean="0"/>
-              <a:t>2021 október</a:t>
-            </a:r>
+              <a:t>2021 </a:t>
+            </a:r>
+            <a:r>
+              <a:rPr lang="hu-HU" dirty="0" smtClean="0"/>
+              <a:t>október 5</a:t>
+            </a:r>
+            <a:endParaRPr lang="hu-HU" dirty="0" smtClean="0"/>
           </a:p>
           <a:p>
             <a:r>
@@ -6436,8 +6441,46 @@
           <a:p>
             <a:r>
               <a:rPr lang="hu-HU" dirty="0" smtClean="0"/>
-              <a:t>Modernizált felület</a:t>
-            </a:r>
+              <a:t>Modernizált </a:t>
+            </a:r>
+            <a:r>
+              <a:rPr lang="hu-HU" dirty="0" smtClean="0"/>
+              <a:t>felület</a:t>
+            </a:r>
+          </a:p>
+          <a:p>
+            <a:r>
+              <a:rPr lang="hu-HU" dirty="0" smtClean="0"/>
+              <a:t>Windows </a:t>
+            </a:r>
+            <a:r>
+              <a:rPr lang="hu-HU" dirty="0" err="1"/>
+              <a:t>S</a:t>
+            </a:r>
+            <a:r>
+              <a:rPr lang="hu-HU" dirty="0" err="1" smtClean="0"/>
+              <a:t>ubsystem</a:t>
+            </a:r>
+            <a:r>
+              <a:rPr lang="hu-HU" dirty="0" smtClean="0"/>
+              <a:t> </a:t>
+            </a:r>
+            <a:r>
+              <a:rPr lang="hu-HU" dirty="0" err="1" smtClean="0"/>
+              <a:t>for</a:t>
+            </a:r>
+            <a:r>
+              <a:rPr lang="hu-HU" dirty="0" smtClean="0"/>
+              <a:t> </a:t>
+            </a:r>
+            <a:r>
+              <a:rPr lang="hu-HU" dirty="0" err="1" smtClean="0"/>
+              <a:t>Android</a:t>
+            </a:r>
+            <a:endParaRPr lang="hu-HU" dirty="0" smtClean="0"/>
+          </a:p>
+          <a:p>
+            <a:endParaRPr lang="hu-HU" dirty="0" smtClean="0"/>
           </a:p>
         </p:txBody>
       </p:sp>
@@ -6509,7 +6552,7 @@
             <p:ph idx="1"/>
             <p:extLst>
               <p:ext uri="{D42A27DB-BD31-4B8C-83A1-F6EECF244321}">
-                <p14:modId xmlns:p14="http://schemas.microsoft.com/office/powerpoint/2010/main" val="1092687453"/>
+                <p14:modId xmlns:p14="http://schemas.microsoft.com/office/powerpoint/2010/main" val="552306495"/>
               </p:ext>
             </p:extLst>
           </p:nvPr>
@@ -6810,15 +6853,37 @@
             <p:ph idx="1"/>
           </p:nvPr>
         </p:nvSpPr>
-        <p:spPr/>
+        <p:spPr>
+          <a:xfrm>
+            <a:off x="219897" y="662260"/>
+            <a:ext cx="8534400" cy="3615267"/>
+          </a:xfrm>
+        </p:spPr>
         <p:txBody>
           <a:bodyPr/>
           <a:lstStyle/>
           <a:p>
             <a:r>
               <a:rPr lang="hu-HU" dirty="0" smtClean="0"/>
-              <a:t>1995 és 1998</a:t>
-            </a:r>
+              <a:t>1995 </a:t>
+            </a:r>
+            <a:r>
+              <a:rPr lang="hu-HU" dirty="0"/>
+              <a:t>augusztus 24.</a:t>
+            </a:r>
+            <a:r>
+              <a:rPr lang="hu-HU" dirty="0" smtClean="0"/>
+              <a:t> </a:t>
+            </a:r>
+            <a:r>
+              <a:rPr lang="hu-HU" dirty="0" smtClean="0"/>
+              <a:t>és </a:t>
+            </a:r>
+            <a:r>
+              <a:rPr lang="hu-HU" dirty="0" smtClean="0"/>
+              <a:t>1998 Június 25.</a:t>
+            </a:r>
+            <a:endParaRPr lang="hu-HU" dirty="0" smtClean="0"/>
           </a:p>
           <a:p>
             <a:r>
@@ -7044,8 +7109,13 @@
           <a:p>
             <a:r>
               <a:rPr lang="hu-HU" dirty="0" smtClean="0"/>
-              <a:t>2000 Június</a:t>
-            </a:r>
+              <a:t>2000 </a:t>
+            </a:r>
+            <a:r>
+              <a:rPr lang="hu-HU" dirty="0" smtClean="0"/>
+              <a:t>Június 19.</a:t>
+            </a:r>
+            <a:endParaRPr lang="hu-HU" dirty="0" smtClean="0"/>
           </a:p>
           <a:p>
             <a:r>
@@ -7217,7 +7287,15 @@
           <a:p>
             <a:r>
               <a:rPr lang="hu-HU" dirty="0" smtClean="0"/>
-              <a:t>400+ millió példány </a:t>
+              <a:t>400+ </a:t>
+            </a:r>
+            <a:r>
+              <a:rPr lang="hu-HU" dirty="0" smtClean="0"/>
+              <a:t>millió eladott </a:t>
+            </a:r>
+            <a:r>
+              <a:rPr lang="hu-HU" dirty="0" smtClean="0"/>
+              <a:t>példány </a:t>
             </a:r>
             <a:r>
               <a:rPr lang="hu-HU" dirty="0"/>
@@ -7248,19 +7326,24 @@
           </a:p>
           <a:p>
             <a:r>
-              <a:rPr lang="hu-HU" dirty="0" err="1" smtClean="0"/>
-              <a:t>Mái</a:t>
-            </a:r>
-            <a:r>
               <a:rPr lang="hu-HU" dirty="0" smtClean="0"/>
-              <a:t> napig használják</a:t>
-            </a:r>
-          </a:p>
-          <a:p>
+              <a:t>Mai </a:t>
+            </a:r>
             <a:r>
               <a:rPr lang="hu-HU" dirty="0" smtClean="0"/>
-              <a:t>Első 64 bites Windows</a:t>
-            </a:r>
+              <a:t>napig használják</a:t>
+            </a:r>
+          </a:p>
+          <a:p>
+            <a:r>
+              <a:rPr lang="hu-HU" dirty="0" smtClean="0"/>
+              <a:t>Első 64 </a:t>
+            </a:r>
+            <a:r>
+              <a:rPr lang="hu-HU" dirty="0" smtClean="0"/>
+              <a:t>bitet támogató verzió</a:t>
+            </a:r>
+            <a:endParaRPr lang="hu-HU" dirty="0" smtClean="0"/>
           </a:p>
           <a:p>
             <a:r>
@@ -7347,6 +7430,15 @@
               <a:rPr lang="hu-HU" dirty="0" smtClean="0"/>
               <a:t>2007 </a:t>
             </a:r>
+            <a:r>
+              <a:rPr lang="hu-HU" dirty="0"/>
+              <a:t>január 30.</a:t>
+            </a:r>
+            <a:r>
+              <a:rPr lang="hu-HU" dirty="0" smtClean="0"/>
+              <a:t> </a:t>
+            </a:r>
+            <a:endParaRPr lang="hu-HU" dirty="0" smtClean="0"/>
           </a:p>
           <a:p>
             <a:r>
@@ -7506,8 +7598,13 @@
           <a:p>
             <a:r>
               <a:rPr lang="hu-HU" dirty="0" smtClean="0"/>
-              <a:t>2009</a:t>
-            </a:r>
+              <a:t>2009 </a:t>
+            </a:r>
+            <a:r>
+              <a:rPr lang="hu-HU" dirty="0"/>
+              <a:t>október 22.</a:t>
+            </a:r>
+            <a:endParaRPr lang="hu-HU" dirty="0" smtClean="0"/>
           </a:p>
           <a:p>
             <a:r>
@@ -7606,14 +7703,26 @@
           <a:p>
             <a:r>
               <a:rPr lang="hu-HU" dirty="0" smtClean="0"/>
-              <a:t>2012</a:t>
-            </a:r>
+              <a:t>2012 október 26. és 2013 október 17.</a:t>
+            </a:r>
+            <a:endParaRPr lang="hu-HU" dirty="0" smtClean="0"/>
           </a:p>
           <a:p>
             <a:r>
               <a:rPr lang="hu-HU" dirty="0" smtClean="0"/>
-              <a:t>Metro felület: népszerűtlen</a:t>
-            </a:r>
+              <a:t>Metro felület: </a:t>
+            </a:r>
+            <a:r>
+              <a:rPr lang="hu-HU" dirty="0" smtClean="0"/>
+              <a:t>népszerűtlen</a:t>
+            </a:r>
+          </a:p>
+          <a:p>
+            <a:r>
+              <a:rPr lang="hu-HU" dirty="0" smtClean="0"/>
+              <a:t>Start menü nincs</a:t>
+            </a:r>
+            <a:endParaRPr lang="hu-HU" dirty="0" smtClean="0"/>
           </a:p>
           <a:p>
             <a:r>
@@ -7629,6 +7738,17 @@
             <a:r>
               <a:rPr lang="hu-HU" dirty="0" err="1" smtClean="0"/>
               <a:t>alapkövei</a:t>
+            </a:r>
+            <a:endParaRPr lang="hu-HU" dirty="0" smtClean="0"/>
+          </a:p>
+          <a:p>
+            <a:r>
+              <a:rPr lang="hu-HU" dirty="0" smtClean="0"/>
+              <a:t>Microsoft </a:t>
+            </a:r>
+            <a:r>
+              <a:rPr lang="hu-HU" dirty="0" err="1" smtClean="0"/>
+              <a:t>Store</a:t>
             </a:r>
             <a:endParaRPr lang="hu-HU" dirty="0" smtClean="0"/>
           </a:p>
@@ -7711,19 +7831,35 @@
           <a:p>
             <a:r>
               <a:rPr lang="hu-HU" dirty="0" smtClean="0"/>
-              <a:t>2015 július 28</a:t>
-            </a:r>
-          </a:p>
-          <a:p>
+              <a:t>2015 július </a:t>
+            </a:r>
             <a:r>
               <a:rPr lang="hu-HU" dirty="0" smtClean="0"/>
-              <a:t>”Utolsó” </a:t>
-            </a:r>
-            <a:r>
-              <a:rPr lang="hu-HU" smtClean="0"/>
-              <a:t>számozott kiadás</a:t>
+              <a:t>29</a:t>
+            </a:r>
+          </a:p>
+          <a:p>
+            <a:r>
+              <a:rPr lang="hu-HU" dirty="0" smtClean="0"/>
+              <a:t>Start menü visszakerül</a:t>
+            </a:r>
+          </a:p>
+          <a:p>
+            <a:r>
+              <a:rPr lang="hu-HU" dirty="0" err="1" smtClean="0"/>
+              <a:t>Edge</a:t>
+            </a:r>
+            <a:r>
+              <a:rPr lang="hu-HU" dirty="0" smtClean="0"/>
+              <a:t> böngésző</a:t>
             </a:r>
             <a:endParaRPr lang="hu-HU" dirty="0" smtClean="0"/>
+          </a:p>
+          <a:p>
+            <a:r>
+              <a:rPr lang="hu-HU" dirty="0" smtClean="0"/>
+              <a:t>”Utolsó” számozott kiadás</a:t>
+            </a:r>
           </a:p>
           <a:p>
             <a:endParaRPr lang="hu-HU" dirty="0"/>

</xml_diff>